<commit_message>
Adjust position of plots in cheatsheet
</commit_message>
<xml_diff>
--- a/tests/cheatsheet/quanteda-cheatsheet.pptx
+++ b/tests/cheatsheet/quanteda-cheatsheet.pptx
@@ -8691,15 +8691,7 @@
                 <a:ea typeface="Monaco" charset="0"/>
                 <a:cs typeface="Monaco" charset="0"/>
               </a:rPr>
-              <a:t>"</a:t>
-            </a:r>
-            <a:r>
-              <a:rPr lang="en-GB" sz="1300" smtClean="0">
-                <a:latin typeface="Monaco" charset="0"/>
-                <a:ea typeface="Monaco" charset="0"/>
-                <a:cs typeface="Monaco" charset="0"/>
-              </a:rPr>
-              <a:t>documents")</a:t>
+              <a:t>"documents")</a:t>
             </a:r>
             <a:r>
               <a:rPr lang="en-GB" sz="1300" dirty="0">
@@ -9825,7 +9817,7 @@
         </p:blipFill>
         <p:spPr>
           <a:xfrm>
-            <a:off x="11676145" y="5425035"/>
+            <a:off x="11814893" y="5436429"/>
             <a:ext cx="1809004" cy="1356753"/>
           </a:xfrm>
           <a:prstGeom prst="rect">
@@ -9854,7 +9846,7 @@
         </p:blipFill>
         <p:spPr>
           <a:xfrm>
-            <a:off x="11814893" y="4147026"/>
+            <a:off x="11963411" y="4138055"/>
             <a:ext cx="1328655" cy="1323367"/>
           </a:xfrm>
           <a:prstGeom prst="rect">
@@ -9884,8 +9876,8 @@
         </p:blipFill>
         <p:spPr>
           <a:xfrm>
-            <a:off x="11693274" y="6962611"/>
-            <a:ext cx="2075283" cy="1297052"/>
+            <a:off x="11866173" y="6962611"/>
+            <a:ext cx="1902384" cy="1188990"/>
           </a:xfrm>
           <a:prstGeom prst="rect">
             <a:avLst/>
@@ -9914,7 +9906,7 @@
         </p:blipFill>
         <p:spPr>
           <a:xfrm>
-            <a:off x="11693274" y="8224938"/>
+            <a:off x="11814893" y="8204846"/>
             <a:ext cx="1800336" cy="1287658"/>
           </a:xfrm>
           <a:prstGeom prst="rect">

</xml_diff>

<commit_message>
Incorporate @kbenoit's requested changes
</commit_message>
<xml_diff>
--- a/tests/cheatsheet/quanteda-cheatsheet.pptx
+++ b/tests/cheatsheet/quanteda-cheatsheet.pptx
@@ -4350,24 +4350,8 @@
             </a:r>
             <a:r>
               <a:rPr lang="en-GB" sz="1300" dirty="0" err="1" smtClean="0">
-                <a:latin typeface="Monaco" charset="0"/>
-                <a:ea typeface="Monaco" charset="0"/>
-                <a:cs typeface="Monaco" charset="0"/>
-              </a:rPr>
-              <a:t>stopwords</a:t>
-            </a:r>
-            <a:r>
-              <a:rPr lang="en-GB" sz="1300" dirty="0" smtClean="0">
-                <a:latin typeface="Monaco" charset="0"/>
-                <a:ea typeface="Monaco" charset="0"/>
-                <a:cs typeface="Monaco" charset="0"/>
-              </a:rPr>
-              <a:t>::</a:t>
-            </a:r>
-            <a:r>
-              <a:rPr lang="en-GB" sz="1300" dirty="0" err="1" smtClean="0">
-                <a:solidFill>
-                  <a:srgbClr val="006AC7"/>
+                <a:solidFill>
+                  <a:schemeClr val="tx1"/>
                 </a:solidFill>
                 <a:latin typeface="Monaco" charset="0"/>
                 <a:ea typeface="Monaco" charset="0"/>
@@ -7846,25 +7830,9 @@
               <a:t>(remove = </a:t>
             </a:r>
             <a:r>
-              <a:rPr lang="en-GB" sz="1300" dirty="0" err="1">
-                <a:latin typeface="Monaco" charset="0"/>
-                <a:ea typeface="Monaco" charset="0"/>
-                <a:cs typeface="Monaco" charset="0"/>
-              </a:rPr>
-              <a:t>stopwords</a:t>
-            </a:r>
-            <a:r>
-              <a:rPr lang="en-GB" sz="1300" dirty="0">
-                <a:latin typeface="Monaco" charset="0"/>
-                <a:ea typeface="Monaco" charset="0"/>
-                <a:cs typeface="Monaco" charset="0"/>
-              </a:rPr>
-              <a:t>::</a:t>
-            </a:r>
-            <a:r>
-              <a:rPr lang="en-GB" sz="1300" dirty="0" err="1">
-                <a:solidFill>
-                  <a:srgbClr val="006AC7"/>
+              <a:rPr lang="en-GB" sz="1300" dirty="0" err="1" smtClean="0">
+                <a:solidFill>
+                  <a:schemeClr val="tx1"/>
                 </a:solidFill>
                 <a:latin typeface="Monaco" charset="0"/>
                 <a:ea typeface="Monaco" charset="0"/>
@@ -8422,24 +8390,8 @@
             </a:r>
             <a:r>
               <a:rPr lang="en-GB" sz="1300" dirty="0" err="1" smtClean="0">
-                <a:latin typeface="Monaco" charset="0"/>
-                <a:ea typeface="Monaco" charset="0"/>
-                <a:cs typeface="Monaco" charset="0"/>
-              </a:rPr>
-              <a:t>stopwords</a:t>
-            </a:r>
-            <a:r>
-              <a:rPr lang="en-GB" sz="1300" dirty="0" smtClean="0">
-                <a:latin typeface="Monaco" charset="0"/>
-                <a:ea typeface="Monaco" charset="0"/>
-                <a:cs typeface="Monaco" charset="0"/>
-              </a:rPr>
-              <a:t>::</a:t>
-            </a:r>
-            <a:r>
-              <a:rPr lang="en-GB" sz="1300" dirty="0" err="1" smtClean="0">
-                <a:solidFill>
-                  <a:srgbClr val="006AC7"/>
+                <a:solidFill>
+                  <a:schemeClr val="tx1"/>
                 </a:solidFill>
                 <a:latin typeface="Monaco" charset="0"/>
                 <a:ea typeface="Monaco" charset="0"/>
@@ -8686,7 +8638,7 @@
               <a:t>= </a:t>
             </a:r>
             <a:r>
-              <a:rPr lang="en-GB" sz="1300" smtClean="0">
+              <a:rPr lang="en-GB" sz="1300" dirty="0" smtClean="0">
                 <a:latin typeface="Monaco" charset="0"/>
                 <a:ea typeface="Monaco" charset="0"/>
                 <a:cs typeface="Monaco" charset="0"/>

</xml_diff>

<commit_message>
Update cheatsheet (pptx file)
</commit_message>
<xml_diff>
--- a/tests/cheatsheet/quanteda-cheatsheet.pptx
+++ b/tests/cheatsheet/quanteda-cheatsheet.pptx
@@ -107,36 +107,16 @@
 
 <file path=ppt/commentAuthors.xml><?xml version="1.0" encoding="utf-8"?>
 <p:cmAuthorLst xmlns:a="http://schemas.openxmlformats.org/drawingml/2006/main" xmlns:r="http://schemas.openxmlformats.org/officeDocument/2006/relationships" xmlns:p="http://schemas.openxmlformats.org/presentationml/2006/main">
-  <p:cmAuthor id="7" name="Benoit,KR" initials="B [7]" lastIdx="1" clrIdx="6">
-    <p:extLst/>
-  </p:cmAuthor>
-  <p:cmAuthor id="1" name="Benoit,KR" initials="B" lastIdx="1" clrIdx="0">
-    <p:extLst/>
-  </p:cmAuthor>
-  <p:cmAuthor id="8" name="Benoit,KR" initials="B [8]" lastIdx="1" clrIdx="7">
-    <p:extLst/>
-  </p:cmAuthor>
-  <p:cmAuthor id="2" name="Benoit,KR" initials="B [2]" lastIdx="1" clrIdx="1">
-    <p:extLst/>
-  </p:cmAuthor>
-  <p:cmAuthor id="9" name="Benoit,KR" initials="B [9]" lastIdx="1" clrIdx="8">
-    <p:extLst/>
-  </p:cmAuthor>
-  <p:cmAuthor id="3" name="Benoit,KR" initials="B [3]" lastIdx="1" clrIdx="2">
-    <p:extLst/>
-  </p:cmAuthor>
-  <p:cmAuthor id="10" name="Benoit,KR" initials="B [10]" lastIdx="1" clrIdx="9">
-    <p:extLst/>
-  </p:cmAuthor>
-  <p:cmAuthor id="4" name="Benoit,KR" initials="B [4]" lastIdx="1" clrIdx="3">
-    <p:extLst/>
-  </p:cmAuthor>
-  <p:cmAuthor id="5" name="Benoit,KR" initials="B [5]" lastIdx="1" clrIdx="4">
-    <p:extLst/>
-  </p:cmAuthor>
-  <p:cmAuthor id="6" name="Benoit,KR" initials="B [6]" lastIdx="1" clrIdx="5">
-    <p:extLst/>
-  </p:cmAuthor>
+  <p:cmAuthor id="7" name="Benoit,KR" initials="B [7]" lastIdx="1" clrIdx="6"/>
+  <p:cmAuthor id="1" name="Benoit,KR" initials="B" lastIdx="1" clrIdx="0"/>
+  <p:cmAuthor id="8" name="Benoit,KR" initials="B [8]" lastIdx="1" clrIdx="7"/>
+  <p:cmAuthor id="2" name="Benoit,KR" initials="B [2]" lastIdx="1" clrIdx="1"/>
+  <p:cmAuthor id="9" name="Benoit,KR" initials="B [9]" lastIdx="1" clrIdx="8"/>
+  <p:cmAuthor id="3" name="Benoit,KR" initials="B [3]" lastIdx="1" clrIdx="2"/>
+  <p:cmAuthor id="10" name="Benoit,KR" initials="B [10]" lastIdx="1" clrIdx="9"/>
+  <p:cmAuthor id="4" name="Benoit,KR" initials="B [4]" lastIdx="1" clrIdx="3"/>
+  <p:cmAuthor id="5" name="Benoit,KR" initials="B [5]" lastIdx="1" clrIdx="4"/>
+  <p:cmAuthor id="6" name="Benoit,KR" initials="B [6]" lastIdx="1" clrIdx="5"/>
 </p:cmAuthorLst>
 </file>
 
@@ -2114,8 +2094,8 @@
         </p:nvSpPr>
         <p:spPr>
           <a:xfrm>
-            <a:off x="3928502" y="1212238"/>
-            <a:ext cx="2966163" cy="2728346"/>
+            <a:off x="3831787" y="1212238"/>
+            <a:ext cx="3052773" cy="2728346"/>
           </a:xfrm>
           <a:prstGeom prst="rect">
             <a:avLst/>
@@ -2328,7 +2308,7 @@
         </p:nvSpPr>
         <p:spPr>
           <a:xfrm>
-            <a:off x="262621" y="1712046"/>
+            <a:off x="288983" y="1607350"/>
             <a:ext cx="3503467" cy="2257028"/>
           </a:xfrm>
           <a:prstGeom prst="rect">
@@ -2514,23 +2494,7 @@
                 <a:ea typeface="Source Sans Pro" charset="0"/>
                 <a:cs typeface="Source Sans Pro" charset="0"/>
               </a:rPr>
-              <a:t>* fit (un-</a:t>
-            </a:r>
-            <a:r>
-              <a:rPr lang="en-US" sz="1400">
-                <a:latin typeface="Source Sans Pro" charset="0"/>
-                <a:ea typeface="Source Sans Pro" charset="0"/>
-                <a:cs typeface="Source Sans Pro" charset="0"/>
-              </a:rPr>
-              <a:t>)supervised </a:t>
-            </a:r>
-            <a:r>
-              <a:rPr lang="en-US" sz="1400" dirty="0">
-                <a:latin typeface="Source Sans Pro" charset="0"/>
-                <a:ea typeface="Source Sans Pro" charset="0"/>
-                <a:cs typeface="Source Sans Pro" charset="0"/>
-              </a:rPr>
-              <a:t>models</a:t>
+              <a:t>* fit (un-)supervised models</a:t>
             </a:r>
           </a:p>
           <a:p>
@@ -2772,7 +2736,7 @@
         <p:spPr>
           <a:xfrm>
             <a:off x="520861" y="4738679"/>
-            <a:ext cx="6216624" cy="5996513"/>
+            <a:ext cx="6216624" cy="5334794"/>
           </a:xfrm>
           <a:prstGeom prst="rect">
             <a:avLst/>
@@ -3028,7 +2992,7 @@
                 <a:ea typeface="Monaco" charset="0"/>
                 <a:cs typeface="Monaco" charset="0"/>
               </a:rPr>
-              <a:t># Corpus consisting of 58 documents, showing 2 documents:</a:t>
+              <a:t>## Corpus consisting of 58 documents, showing 2 documents:</a:t>
             </a:r>
           </a:p>
           <a:p>
@@ -3039,23 +3003,18 @@
                 <a:ea typeface="Monaco" charset="0"/>
                 <a:cs typeface="Monaco" charset="0"/>
               </a:rPr>
-              <a:t>#            Text Types Tokens Sentences Year  President </a:t>
-            </a:r>
-            <a:r>
-              <a:rPr lang="en-US" sz="1000" dirty="0" err="1">
-                <a:latin typeface="Monaco" charset="0"/>
-                <a:ea typeface="Monaco" charset="0"/>
-                <a:cs typeface="Monaco" charset="0"/>
-              </a:rPr>
-              <a:t>FirstName</a:t>
-            </a:r>
+              <a:t>## </a:t>
+            </a:r>
+          </a:p>
+          <a:p>
+            <a:pPr algn="l"/>
             <a:r>
               <a:rPr lang="en-US" sz="1000" dirty="0">
                 <a:latin typeface="Monaco" charset="0"/>
                 <a:ea typeface="Monaco" charset="0"/>
                 <a:cs typeface="Monaco" charset="0"/>
               </a:rPr>
-              <a:t> </a:t>
+              <a:t>##             Text Types Tokens Sentences Year  President FirstName Party</a:t>
             </a:r>
           </a:p>
           <a:p>
@@ -3066,7 +3025,7 @@
                 <a:ea typeface="Monaco" charset="0"/>
                 <a:cs typeface="Monaco" charset="0"/>
               </a:rPr>
-              <a:t># 1789-Washington   625   1538        23 1789 Washington    George </a:t>
+              <a:t>##  1789-Washington   625   1537        23 1789 Washington    George  none</a:t>
             </a:r>
           </a:p>
           <a:p>
@@ -3077,89 +3036,8 @@
                 <a:ea typeface="Monaco" charset="0"/>
                 <a:cs typeface="Monaco" charset="0"/>
               </a:rPr>
-              <a:t># 1793-Washington    96    147         4 1793 Washington    George</a:t>
-            </a:r>
-          </a:p>
-          <a:p>
-            <a:pPr algn="l"/>
-            <a:r>
-              <a:rPr lang="en-US" sz="1000" dirty="0">
-                <a:latin typeface="Monaco" charset="0"/>
-                <a:ea typeface="Monaco" charset="0"/>
-                <a:cs typeface="Monaco" charset="0"/>
-              </a:rPr>
-              <a:t>#</a:t>
-            </a:r>
-          </a:p>
-          <a:p>
-            <a:pPr algn="l"/>
-            <a:r>
-              <a:rPr lang="en-US" sz="1000" dirty="0">
-                <a:latin typeface="Monaco" charset="0"/>
-                <a:ea typeface="Monaco" charset="0"/>
-                <a:cs typeface="Monaco" charset="0"/>
-              </a:rPr>
-              <a:t># Source:  Gerhard Peters and John T. Woolley. The American Presidency Project.</a:t>
-            </a:r>
-          </a:p>
-          <a:p>
-            <a:pPr algn="l"/>
-            <a:r>
-              <a:rPr lang="en-US" sz="1000" dirty="0">
-                <a:latin typeface="Monaco" charset="0"/>
-                <a:ea typeface="Monaco" charset="0"/>
-                <a:cs typeface="Monaco" charset="0"/>
-              </a:rPr>
-              <a:t># Created: Tue Jun 13 14:51:47 2017</a:t>
-            </a:r>
-          </a:p>
-          <a:p>
-            <a:pPr algn="l"/>
-            <a:r>
-              <a:rPr lang="en-US" sz="1000" dirty="0">
-                <a:latin typeface="Monaco" charset="0"/>
-                <a:ea typeface="Monaco" charset="0"/>
-                <a:cs typeface="Monaco" charset="0"/>
-              </a:rPr>
-              <a:t># Notes:   http://</a:t>
-            </a:r>
-            <a:r>
-              <a:rPr lang="en-US" sz="1000" dirty="0" err="1">
-                <a:latin typeface="Monaco" charset="0"/>
-                <a:ea typeface="Monaco" charset="0"/>
-                <a:cs typeface="Monaco" charset="0"/>
-              </a:rPr>
-              <a:t>www.presidency.ucsb.edu</a:t>
-            </a:r>
-            <a:r>
-              <a:rPr lang="en-US" sz="1000" dirty="0">
-                <a:latin typeface="Monaco" charset="0"/>
-                <a:ea typeface="Monaco" charset="0"/>
-                <a:cs typeface="Monaco" charset="0"/>
-              </a:rPr>
-              <a:t>/</a:t>
-            </a:r>
-            <a:r>
-              <a:rPr lang="en-US" sz="1000" dirty="0" err="1">
-                <a:latin typeface="Monaco" charset="0"/>
-                <a:ea typeface="Monaco" charset="0"/>
-                <a:cs typeface="Monaco" charset="0"/>
-              </a:rPr>
-              <a:t>inaugurals.php</a:t>
-            </a:r>
-            <a:r>
-              <a:rPr lang="en-US" sz="1000" dirty="0">
-                <a:latin typeface="Monaco" charset="0"/>
-                <a:ea typeface="Monaco" charset="0"/>
-                <a:cs typeface="Monaco" charset="0"/>
-              </a:rPr>
-              <a:t> </a:t>
-            </a:r>
-            <a:endParaRPr lang="en-US" sz="1000" b="1" dirty="0">
-              <a:latin typeface="Source Sans Pro" charset="0"/>
-              <a:ea typeface="Source Sans Pro" charset="0"/>
-              <a:cs typeface="Source Sans Pro" charset="0"/>
-            </a:endParaRPr>
+              <a:t>##  1793-Washington    96    147         4 1793 Washington    George  none</a:t>
+            </a:r>
           </a:p>
           <a:p>
             <a:pPr algn="l">
@@ -3248,9 +3126,6 @@
             </a:r>
             <a:r>
               <a:rPr lang="en-US" sz="1300" dirty="0">
-                <a:solidFill>
-                  <a:schemeClr val="tx1"/>
-                </a:solidFill>
                 <a:latin typeface="Monaco" charset="0"/>
                 <a:ea typeface="Monaco" charset="0"/>
                 <a:cs typeface="Monaco" charset="0"/>
@@ -3259,9 +3134,6 @@
             </a:r>
             <a:r>
               <a:rPr lang="en-US" sz="1300" dirty="0" err="1">
-                <a:solidFill>
-                  <a:schemeClr val="tx1"/>
-                </a:solidFill>
                 <a:latin typeface="Monaco" charset="0"/>
                 <a:ea typeface="Monaco" charset="0"/>
                 <a:cs typeface="Monaco" charset="0"/>
@@ -3270,23 +3142,23 @@
             </a:r>
             <a:r>
               <a:rPr lang="en-US" sz="1300" dirty="0">
-                <a:solidFill>
-                  <a:schemeClr val="tx1"/>
-                </a:solidFill>
                 <a:latin typeface="Monaco" charset="0"/>
                 <a:ea typeface="Monaco" charset="0"/>
                 <a:cs typeface="Monaco" charset="0"/>
               </a:rPr>
               <a:t>") &lt;- 1:ndoc(x)</a:t>
             </a:r>
-            <a:endParaRPr lang="en-US" sz="1300" dirty="0">
-              <a:solidFill>
-                <a:schemeClr val="tx1"/>
-              </a:solidFill>
-              <a:latin typeface="Source Sans Pro" charset="0"/>
-              <a:ea typeface="Source Sans Pro" charset="0"/>
-              <a:cs typeface="Source Sans Pro" charset="0"/>
-            </a:endParaRPr>
+            <a:r>
+              <a:rPr lang="en-US" sz="1300" dirty="0">
+                <a:solidFill>
+                  <a:srgbClr val="006AC7"/>
+                </a:solidFill>
+                <a:latin typeface="Monaco" charset="0"/>
+                <a:ea typeface="Monaco" charset="0"/>
+                <a:cs typeface="Monaco" charset="0"/>
+              </a:rPr>
+              <a:t> </a:t>
+            </a:r>
           </a:p>
           <a:p>
             <a:pPr algn="l">
@@ -3583,8 +3455,8 @@
         </p:nvSpPr>
         <p:spPr>
           <a:xfrm>
-            <a:off x="229085" y="4049688"/>
-            <a:ext cx="6655475" cy="486431"/>
+            <a:off x="228214" y="4049688"/>
+            <a:ext cx="6659521" cy="486431"/>
           </a:xfrm>
           <a:prstGeom prst="roundRect">
             <a:avLst>
@@ -3666,8 +3538,8 @@
         </p:nvSpPr>
         <p:spPr>
           <a:xfrm>
-            <a:off x="7352820" y="639097"/>
-            <a:ext cx="6645071" cy="7083991"/>
+            <a:off x="7287686" y="554077"/>
+            <a:ext cx="6645071" cy="7299434"/>
           </a:xfrm>
           <a:prstGeom prst="rect">
             <a:avLst/>
@@ -3902,108 +3774,72 @@
           <a:p>
             <a:pPr lvl="0" algn="l"/>
             <a:r>
-              <a:rPr lang="mr-IN" sz="1000" dirty="0">
-                <a:latin typeface="Monaco" charset="0"/>
-                <a:ea typeface="Monaco" charset="0"/>
-                <a:cs typeface="Monaco" charset="0"/>
-              </a:rPr>
-              <a:t>## </a:t>
-            </a:r>
-            <a:r>
-              <a:rPr lang="mr-IN" sz="1000" dirty="0" err="1">
-                <a:latin typeface="Monaco" charset="0"/>
-                <a:ea typeface="Monaco" charset="0"/>
-                <a:cs typeface="Monaco" charset="0"/>
-              </a:rPr>
-              <a:t>Document-feature</a:t>
-            </a:r>
-            <a:r>
-              <a:rPr lang="mr-IN" sz="1000" dirty="0">
-                <a:latin typeface="Monaco" charset="0"/>
-                <a:ea typeface="Monaco" charset="0"/>
-                <a:cs typeface="Monaco" charset="0"/>
-              </a:rPr>
-              <a:t> </a:t>
-            </a:r>
-            <a:r>
-              <a:rPr lang="mr-IN" sz="1000" dirty="0" err="1">
-                <a:latin typeface="Monaco" charset="0"/>
-                <a:ea typeface="Monaco" charset="0"/>
-                <a:cs typeface="Monaco" charset="0"/>
-              </a:rPr>
-              <a:t>matrix</a:t>
-            </a:r>
-            <a:r>
-              <a:rPr lang="mr-IN" sz="1000" dirty="0">
-                <a:latin typeface="Monaco" charset="0"/>
-                <a:ea typeface="Monaco" charset="0"/>
-                <a:cs typeface="Monaco" charset="0"/>
-              </a:rPr>
-              <a:t> of: </a:t>
-            </a:r>
-            <a:r>
-              <a:rPr lang="de-DE" sz="1000" dirty="0">
-                <a:latin typeface="Monaco" charset="0"/>
-                <a:ea typeface="Monaco" charset="0"/>
-                <a:cs typeface="Monaco" charset="0"/>
-              </a:rPr>
-              <a:t>2</a:t>
-            </a:r>
-            <a:r>
-              <a:rPr lang="mr-IN" sz="1000" dirty="0">
-                <a:latin typeface="Monaco" charset="0"/>
-                <a:ea typeface="Monaco" charset="0"/>
-                <a:cs typeface="Monaco" charset="0"/>
-              </a:rPr>
-              <a:t> </a:t>
-            </a:r>
-            <a:r>
-              <a:rPr lang="mr-IN" sz="1000" dirty="0" err="1">
-                <a:latin typeface="Monaco" charset="0"/>
-                <a:ea typeface="Monaco" charset="0"/>
-                <a:cs typeface="Monaco" charset="0"/>
-              </a:rPr>
-              <a:t>documents</a:t>
-            </a:r>
-            <a:r>
-              <a:rPr lang="mr-IN" sz="1000" dirty="0">
-                <a:latin typeface="Monaco" charset="0"/>
-                <a:ea typeface="Monaco" charset="0"/>
-                <a:cs typeface="Monaco" charset="0"/>
-              </a:rPr>
-              <a:t>, 4 </a:t>
-            </a:r>
-            <a:r>
-              <a:rPr lang="mr-IN" sz="1000" dirty="0" err="1">
-                <a:latin typeface="Monaco" charset="0"/>
-                <a:ea typeface="Monaco" charset="0"/>
-                <a:cs typeface="Monaco" charset="0"/>
-              </a:rPr>
-              <a:t>features</a:t>
-            </a:r>
-            <a:r>
-              <a:rPr lang="mr-IN" sz="1000" dirty="0">
-                <a:latin typeface="Monaco" charset="0"/>
-                <a:ea typeface="Monaco" charset="0"/>
-                <a:cs typeface="Monaco" charset="0"/>
-              </a:rPr>
-              <a:t> (41.7% </a:t>
-            </a:r>
-            <a:r>
-              <a:rPr lang="mr-IN" sz="1000" dirty="0" err="1">
-                <a:latin typeface="Monaco" charset="0"/>
-                <a:ea typeface="Monaco" charset="0"/>
-                <a:cs typeface="Monaco" charset="0"/>
-              </a:rPr>
-              <a:t>sparse</a:t>
-            </a:r>
-            <a:r>
-              <a:rPr lang="mr-IN" sz="1000" dirty="0">
-                <a:latin typeface="Monaco" charset="0"/>
-                <a:ea typeface="Monaco" charset="0"/>
-                <a:cs typeface="Monaco" charset="0"/>
-              </a:rPr>
-              <a:t>).</a:t>
+              <a:rPr lang="en-IE" sz="1000" dirty="0">
+                <a:latin typeface="Monaco" charset="0"/>
+                <a:ea typeface="Monaco" charset="0"/>
+                <a:cs typeface="Monaco" charset="0"/>
+              </a:rPr>
+              <a:t>## Document-feature matrix of: 2 documents, 4 features (50.0% sparse) and 4 </a:t>
+            </a:r>
+            <a:r>
+              <a:rPr lang="en-IE" sz="1000" dirty="0" err="1">
+                <a:latin typeface="Monaco" charset="0"/>
+                <a:ea typeface="Monaco" charset="0"/>
+                <a:cs typeface="Monaco" charset="0"/>
+              </a:rPr>
+              <a:t>docvars</a:t>
+            </a:r>
+            <a:r>
+              <a:rPr lang="en-IE" sz="1000" dirty="0">
+                <a:latin typeface="Monaco" charset="0"/>
+                <a:ea typeface="Monaco" charset="0"/>
+                <a:cs typeface="Monaco" charset="0"/>
+              </a:rPr>
+              <a:t>.</a:t>
+            </a:r>
+          </a:p>
+          <a:p>
+            <a:pPr lvl="0" algn="l"/>
+            <a:r>
+              <a:rPr lang="en-IE" sz="1000" dirty="0">
+                <a:latin typeface="Monaco" charset="0"/>
+                <a:ea typeface="Monaco" charset="0"/>
+                <a:cs typeface="Monaco" charset="0"/>
+              </a:rPr>
+              <a:t>##                  features</a:t>
+            </a:r>
+          </a:p>
+          <a:p>
+            <a:pPr lvl="0" algn="l"/>
+            <a:r>
+              <a:rPr lang="en-IE" sz="1000" dirty="0">
+                <a:latin typeface="Monaco" charset="0"/>
+                <a:ea typeface="Monaco" charset="0"/>
+                <a:cs typeface="Monaco" charset="0"/>
+              </a:rPr>
+              <a:t>## docs              fellow-citizens senate house representatives</a:t>
+            </a:r>
+          </a:p>
+          <a:p>
+            <a:pPr lvl="0" algn="l"/>
+            <a:r>
+              <a:rPr lang="en-IE" sz="1000" dirty="0">
+                <a:latin typeface="Monaco" charset="0"/>
+                <a:ea typeface="Monaco" charset="0"/>
+                <a:cs typeface="Monaco" charset="0"/>
+              </a:rPr>
+              <a:t>##   1789-Washington               1      1     2               2</a:t>
+            </a:r>
+          </a:p>
+          <a:p>
+            <a:pPr lvl="0" algn="l"/>
+            <a:r>
+              <a:rPr lang="en-IE" sz="1000" dirty="0">
+                <a:latin typeface="Monaco" charset="0"/>
+                <a:ea typeface="Monaco" charset="0"/>
+                <a:cs typeface="Monaco" charset="0"/>
+              </a:rPr>
+              <a:t>##   1793-Washington               0      0     0               0</a:t>
             </a:r>
             <a:endParaRPr lang="en-GB" sz="1000" dirty="0">
               <a:latin typeface="Monaco" charset="0"/>
@@ -4012,150 +3848,6 @@
             </a:endParaRPr>
           </a:p>
           <a:p>
-            <a:pPr lvl="0" algn="l"/>
-            <a:r>
-              <a:rPr lang="mr-IN" sz="1000" dirty="0">
-                <a:latin typeface="Monaco" charset="0"/>
-                <a:ea typeface="Monaco" charset="0"/>
-                <a:cs typeface="Monaco" charset="0"/>
-              </a:rPr>
-              <a:t>##                  </a:t>
-            </a:r>
-            <a:r>
-              <a:rPr lang="mr-IN" sz="1000" dirty="0" err="1">
-                <a:latin typeface="Monaco" charset="0"/>
-                <a:ea typeface="Monaco" charset="0"/>
-                <a:cs typeface="Monaco" charset="0"/>
-              </a:rPr>
-              <a:t>features</a:t>
-            </a:r>
-            <a:endParaRPr lang="en-GB" sz="1000" dirty="0">
-              <a:latin typeface="Monaco" charset="0"/>
-              <a:ea typeface="Monaco" charset="0"/>
-              <a:cs typeface="Monaco" charset="0"/>
-            </a:endParaRPr>
-          </a:p>
-          <a:p>
-            <a:pPr lvl="0" algn="l"/>
-            <a:r>
-              <a:rPr lang="mr-IN" sz="1000" dirty="0">
-                <a:latin typeface="Monaco" charset="0"/>
-                <a:ea typeface="Monaco" charset="0"/>
-                <a:cs typeface="Monaco" charset="0"/>
-              </a:rPr>
-              <a:t>## </a:t>
-            </a:r>
-            <a:r>
-              <a:rPr lang="mr-IN" sz="1000" dirty="0" err="1">
-                <a:latin typeface="Monaco" charset="0"/>
-                <a:ea typeface="Monaco" charset="0"/>
-                <a:cs typeface="Monaco" charset="0"/>
-              </a:rPr>
-              <a:t>docs</a:t>
-            </a:r>
-            <a:r>
-              <a:rPr lang="mr-IN" sz="1000" dirty="0">
-                <a:latin typeface="Monaco" charset="0"/>
-                <a:ea typeface="Monaco" charset="0"/>
-                <a:cs typeface="Monaco" charset="0"/>
-              </a:rPr>
-              <a:t>              </a:t>
-            </a:r>
-            <a:r>
-              <a:rPr lang="mr-IN" sz="1000" dirty="0" err="1">
-                <a:latin typeface="Monaco" charset="0"/>
-                <a:ea typeface="Monaco" charset="0"/>
-                <a:cs typeface="Monaco" charset="0"/>
-              </a:rPr>
-              <a:t>fellow-citizens</a:t>
-            </a:r>
-            <a:r>
-              <a:rPr lang="mr-IN" sz="1000" dirty="0">
-                <a:latin typeface="Monaco" charset="0"/>
-                <a:ea typeface="Monaco" charset="0"/>
-                <a:cs typeface="Monaco" charset="0"/>
-              </a:rPr>
-              <a:t> </a:t>
-            </a:r>
-            <a:r>
-              <a:rPr lang="mr-IN" sz="1000" dirty="0" err="1">
-                <a:latin typeface="Monaco" charset="0"/>
-                <a:ea typeface="Monaco" charset="0"/>
-                <a:cs typeface="Monaco" charset="0"/>
-              </a:rPr>
-              <a:t>senate</a:t>
-            </a:r>
-            <a:r>
-              <a:rPr lang="mr-IN" sz="1000" dirty="0">
-                <a:latin typeface="Monaco" charset="0"/>
-                <a:ea typeface="Monaco" charset="0"/>
-                <a:cs typeface="Monaco" charset="0"/>
-              </a:rPr>
-              <a:t> </a:t>
-            </a:r>
-            <a:r>
-              <a:rPr lang="mr-IN" sz="1000" dirty="0" err="1">
-                <a:latin typeface="Monaco" charset="0"/>
-                <a:ea typeface="Monaco" charset="0"/>
-                <a:cs typeface="Monaco" charset="0"/>
-              </a:rPr>
-              <a:t>house</a:t>
-            </a:r>
-            <a:r>
-              <a:rPr lang="mr-IN" sz="1000" dirty="0">
-                <a:latin typeface="Monaco" charset="0"/>
-                <a:ea typeface="Monaco" charset="0"/>
-                <a:cs typeface="Monaco" charset="0"/>
-              </a:rPr>
-              <a:t> </a:t>
-            </a:r>
-            <a:r>
-              <a:rPr lang="mr-IN" sz="1000" dirty="0" err="1">
-                <a:latin typeface="Monaco" charset="0"/>
-                <a:ea typeface="Monaco" charset="0"/>
-                <a:cs typeface="Monaco" charset="0"/>
-              </a:rPr>
-              <a:t>representatives</a:t>
-            </a:r>
-            <a:endParaRPr lang="en-GB" sz="1000" dirty="0">
-              <a:latin typeface="Monaco" charset="0"/>
-              <a:ea typeface="Monaco" charset="0"/>
-              <a:cs typeface="Monaco" charset="0"/>
-            </a:endParaRPr>
-          </a:p>
-          <a:p>
-            <a:pPr lvl="0" algn="l"/>
-            <a:r>
-              <a:rPr lang="mr-IN" sz="1000" dirty="0">
-                <a:latin typeface="Monaco" charset="0"/>
-                <a:ea typeface="Monaco" charset="0"/>
-                <a:cs typeface="Monaco" charset="0"/>
-              </a:rPr>
-              <a:t>##   1789-Washington               1      1     2               2</a:t>
-            </a:r>
-            <a:endParaRPr lang="en-GB" sz="1000" dirty="0">
-              <a:latin typeface="Monaco" charset="0"/>
-              <a:ea typeface="Monaco" charset="0"/>
-              <a:cs typeface="Monaco" charset="0"/>
-            </a:endParaRPr>
-          </a:p>
-          <a:p>
-            <a:pPr lvl="0" algn="l"/>
-            <a:r>
-              <a:rPr lang="mr-IN" sz="1000" dirty="0">
-                <a:latin typeface="Monaco" charset="0"/>
-                <a:ea typeface="Monaco" charset="0"/>
-                <a:cs typeface="Monaco" charset="0"/>
-              </a:rPr>
-              <a:t>##   1793-Washington               0      0     0               0</a:t>
-            </a:r>
-            <a:endParaRPr lang="en-GB" sz="1000" dirty="0">
-              <a:latin typeface="Monaco" charset="0"/>
-              <a:ea typeface="Monaco" charset="0"/>
-              <a:cs typeface="Monaco" charset="0"/>
-            </a:endParaRPr>
-          </a:p>
-          <a:p>
             <a:pPr algn="l">
               <a:spcBef>
                 <a:spcPts val="800"/>
@@ -4291,7 +3983,7 @@
                 <a:ea typeface="Monaco" charset="0"/>
                 <a:cs typeface="Monaco" charset="0"/>
               </a:rPr>
-              <a:t>(x, dictionary = data_dictionary_LSD2015)</a:t>
+              <a:t>(x, pattern = data_dictionary_LSD2015,                      	     selection = c ("keep", "remove"))</a:t>
             </a:r>
           </a:p>
           <a:p>
@@ -4370,7 +4062,19 @@
                 <a:ea typeface="Monaco" charset="0"/>
                 <a:cs typeface="Monaco" charset="0"/>
               </a:rPr>
-              <a:t>(x, type = "prop") | </a:t>
+              <a:t>(x, </a:t>
+            </a:r>
+            <a:r>
+              <a:rPr lang="en-IE" sz="1400" dirty="0"/>
+              <a:t>scheme</a:t>
+            </a:r>
+            <a:r>
+              <a:rPr lang="en-GB" sz="1300" dirty="0">
+                <a:latin typeface="Monaco" charset="0"/>
+                <a:ea typeface="Monaco" charset="0"/>
+                <a:cs typeface="Monaco" charset="0"/>
+              </a:rPr>
+              <a:t> = "prop") | </a:t>
             </a:r>
             <a:r>
               <a:rPr lang="en-GB" sz="1300" dirty="0" err="1">
@@ -4810,8 +4514,8 @@
         </p:nvSpPr>
         <p:spPr>
           <a:xfrm>
-            <a:off x="4023836" y="1697976"/>
-            <a:ext cx="3053316" cy="1938992"/>
+            <a:off x="3931008" y="1577042"/>
+            <a:ext cx="3053316" cy="2369880"/>
           </a:xfrm>
           <a:prstGeom prst="rect">
             <a:avLst/>
@@ -4868,6 +4572,33 @@
                 <a:ea typeface="Source Sans Pro" charset="0"/>
                 <a:cs typeface="Source Sans Pro" charset="0"/>
               </a:rPr>
+              <a:t>quanteda.textmodels</a:t>
+            </a:r>
+            <a:r>
+              <a:rPr lang="en-US" sz="1400" dirty="0">
+                <a:latin typeface="Source Sans Pro" charset="0"/>
+                <a:ea typeface="Source Sans Pro" charset="0"/>
+                <a:cs typeface="Source Sans Pro" charset="0"/>
+              </a:rPr>
+              <a:t>: Text scaling and classification models</a:t>
+            </a:r>
+            <a:endParaRPr lang="en-US" sz="1400" b="1" dirty="0">
+              <a:latin typeface="Source Sans Pro" charset="0"/>
+              <a:ea typeface="Source Sans Pro" charset="0"/>
+              <a:cs typeface="Source Sans Pro" charset="0"/>
+            </a:endParaRPr>
+          </a:p>
+          <a:p>
+            <a:pPr marL="171450" indent="-171450" algn="l">
+              <a:buFont typeface="Arial" charset="0"/>
+              <a:buChar char="•"/>
+            </a:pPr>
+            <a:r>
+              <a:rPr lang="en-US" sz="1400" b="1" dirty="0" err="1">
+                <a:latin typeface="Source Sans Pro" charset="0"/>
+                <a:ea typeface="Source Sans Pro" charset="0"/>
+                <a:cs typeface="Source Sans Pro" charset="0"/>
+              </a:rPr>
               <a:t>readtext</a:t>
             </a:r>
             <a:r>
@@ -4992,8 +4723,8 @@
         </p:nvSpPr>
         <p:spPr>
           <a:xfrm>
-            <a:off x="3928502" y="1052562"/>
-            <a:ext cx="2966164" cy="460830"/>
+            <a:off x="3831787" y="1052562"/>
+            <a:ext cx="3052774" cy="460830"/>
           </a:xfrm>
           <a:prstGeom prst="roundRect">
             <a:avLst>
@@ -5042,8 +4773,8 @@
         </p:nvSpPr>
         <p:spPr>
           <a:xfrm>
-            <a:off x="7103808" y="7804223"/>
-            <a:ext cx="6762683" cy="478998"/>
+            <a:off x="7100633" y="7804223"/>
+            <a:ext cx="6771600" cy="478998"/>
           </a:xfrm>
           <a:prstGeom prst="roundRect">
             <a:avLst>
@@ -5130,8 +4861,8 @@
         </p:nvSpPr>
         <p:spPr>
           <a:xfrm>
-            <a:off x="7149245" y="141938"/>
-            <a:ext cx="6696000" cy="7444880"/>
+            <a:off x="7149245" y="141937"/>
+            <a:ext cx="6696000" cy="7555013"/>
           </a:xfrm>
           <a:prstGeom prst="rect">
             <a:avLst/>
@@ -5200,7 +4931,7 @@
         </p:nvSpPr>
         <p:spPr>
           <a:xfrm>
-            <a:off x="7110219" y="42189"/>
+            <a:off x="7113394" y="42189"/>
             <a:ext cx="6771600" cy="491636"/>
           </a:xfrm>
           <a:prstGeom prst="roundRect">
@@ -5311,7 +5042,7 @@
         <p:spPr>
           <a:xfrm>
             <a:off x="7340628" y="8337479"/>
-            <a:ext cx="5565144" cy="1926168"/>
+            <a:ext cx="6214938" cy="1926168"/>
           </a:xfrm>
           <a:prstGeom prst="rect">
             <a:avLst/>
@@ -5405,7 +5136,7 @@
                 <a:ea typeface="Monaco" charset="0"/>
                 <a:cs typeface="Monaco" charset="0"/>
               </a:rPr>
-              <a:t>, "</a:t>
+              <a:t>, pattern = "</a:t>
             </a:r>
             <a:r>
               <a:rPr lang="en-US" sz="1300" dirty="0" err="1">
@@ -5829,8 +5560,8 @@
         </p:nvSpPr>
         <p:spPr>
           <a:xfrm>
-            <a:off x="167426" y="441367"/>
-            <a:ext cx="6363268" cy="4396107"/>
+            <a:off x="167426" y="441368"/>
+            <a:ext cx="6363268" cy="4190121"/>
           </a:xfrm>
           <a:prstGeom prst="rect">
             <a:avLst/>
@@ -5899,8 +5630,8 @@
         </p:nvSpPr>
         <p:spPr>
           <a:xfrm>
-            <a:off x="168514" y="5210934"/>
-            <a:ext cx="6362365" cy="4396107"/>
+            <a:off x="169806" y="4931798"/>
+            <a:ext cx="6362365" cy="4625726"/>
           </a:xfrm>
           <a:prstGeom prst="rect">
             <a:avLst/>
@@ -5969,8 +5700,8 @@
         </p:nvSpPr>
         <p:spPr>
           <a:xfrm>
-            <a:off x="6684461" y="441367"/>
-            <a:ext cx="7178303" cy="3120579"/>
+            <a:off x="6684461" y="441368"/>
+            <a:ext cx="7178303" cy="4190120"/>
           </a:xfrm>
           <a:prstGeom prst="rect">
             <a:avLst/>
@@ -6039,8 +5770,8 @@
         </p:nvSpPr>
         <p:spPr>
           <a:xfrm>
-            <a:off x="6676472" y="3916352"/>
-            <a:ext cx="7178303" cy="5688180"/>
+            <a:off x="6676472" y="4986597"/>
+            <a:ext cx="7178303" cy="4570927"/>
           </a:xfrm>
           <a:prstGeom prst="rect">
             <a:avLst/>
@@ -6109,8 +5840,8 @@
         </p:nvSpPr>
         <p:spPr>
           <a:xfrm>
-            <a:off x="6799471" y="823634"/>
-            <a:ext cx="7107106" cy="2564805"/>
+            <a:off x="6794697" y="1199478"/>
+            <a:ext cx="7107106" cy="3098284"/>
           </a:xfrm>
           <a:prstGeom prst="rect">
             <a:avLst/>
@@ -6247,6 +5978,68 @@
               </a:spcBef>
             </a:pPr>
             <a:r>
+              <a:rPr lang="en-GB" sz="1500" b="1" dirty="0">
+                <a:latin typeface="Source Sans Pro" charset="0"/>
+                <a:ea typeface="Source Sans Pro" charset="0"/>
+                <a:cs typeface="Source Sans Pro" charset="0"/>
+              </a:rPr>
+              <a:t>SVM classifier for texts</a:t>
+            </a:r>
+          </a:p>
+          <a:p>
+            <a:pPr algn="l"/>
+            <a:r>
+              <a:rPr lang="en-GB" sz="1300" dirty="0" err="1">
+                <a:solidFill>
+                  <a:srgbClr val="006AC7"/>
+                </a:solidFill>
+                <a:latin typeface="Monaco" charset="0"/>
+                <a:ea typeface="Monaco" charset="0"/>
+                <a:cs typeface="Monaco" charset="0"/>
+              </a:rPr>
+              <a:t>textmodel_svm</a:t>
+            </a:r>
+            <a:r>
+              <a:rPr lang="en-GB" sz="1300" dirty="0">
+                <a:solidFill>
+                  <a:schemeClr val="tx1"/>
+                </a:solidFill>
+                <a:latin typeface="Monaco" charset="0"/>
+                <a:ea typeface="Monaco" charset="0"/>
+                <a:cs typeface="Monaco" charset="0"/>
+              </a:rPr>
+              <a:t>(x, y = </a:t>
+            </a:r>
+            <a:r>
+              <a:rPr lang="en-GB" sz="1300" dirty="0" err="1">
+                <a:solidFill>
+                  <a:schemeClr val="tx1"/>
+                </a:solidFill>
+                <a:latin typeface="Monaco" charset="0"/>
+                <a:ea typeface="Monaco" charset="0"/>
+                <a:cs typeface="Monaco" charset="0"/>
+              </a:rPr>
+              <a:t>training_labels</a:t>
+            </a:r>
+            <a:r>
+              <a:rPr lang="en-GB" sz="1300" dirty="0">
+                <a:solidFill>
+                  <a:schemeClr val="tx1"/>
+                </a:solidFill>
+                <a:latin typeface="Monaco" charset="0"/>
+                <a:ea typeface="Monaco" charset="0"/>
+                <a:cs typeface="Monaco" charset="0"/>
+              </a:rPr>
+              <a:t>)</a:t>
+            </a:r>
+          </a:p>
+          <a:p>
+            <a:pPr algn="l">
+              <a:spcBef>
+                <a:spcPts val="800"/>
+              </a:spcBef>
+            </a:pPr>
+            <a:r>
               <a:rPr lang="en-GB" sz="1500" b="1" dirty="0" err="1">
                 <a:solidFill>
                   <a:schemeClr val="tx1"/>
@@ -6648,8 +6441,8 @@
         </p:nvSpPr>
         <p:spPr>
           <a:xfrm>
-            <a:off x="6799156" y="4249220"/>
-            <a:ext cx="6948911" cy="5355312"/>
+            <a:off x="6799156" y="5267948"/>
+            <a:ext cx="6948911" cy="4355038"/>
           </a:xfrm>
           <a:prstGeom prst="rect">
             <a:avLst/>
@@ -6846,6 +6639,11 @@
               </a:rPr>
               <a:t>	</a:t>
             </a:r>
+            <a:endParaRPr lang="en-GB" sz="1300" b="1" dirty="0">
+              <a:latin typeface="Source Sans Pro" charset="0"/>
+              <a:ea typeface="Source Sans Pro" charset="0"/>
+              <a:cs typeface="Source Sans Pro" charset="0"/>
+            </a:endParaRPr>
           </a:p>
           <a:p>
             <a:pPr algn="l"/>
@@ -6855,7 +6653,15 @@
                 <a:ea typeface="Source Sans Pro" charset="0"/>
                 <a:cs typeface="Source Sans Pro" charset="0"/>
               </a:rPr>
-              <a:t>Plot the dispersion of key word(s)</a:t>
+              <a:t>Plot word </a:t>
+            </a:r>
+            <a:r>
+              <a:rPr lang="en-GB" sz="1500" b="1" dirty="0" err="1">
+                <a:latin typeface="Source Sans Pro" charset="0"/>
+                <a:ea typeface="Source Sans Pro" charset="0"/>
+                <a:cs typeface="Source Sans Pro" charset="0"/>
+              </a:rPr>
+              <a:t>keyness</a:t>
             </a:r>
             <a:endParaRPr lang="en-GB" sz="1500" dirty="0">
               <a:latin typeface="Source Sans Pro" charset="0"/>
@@ -6867,6 +6673,104 @@
             <a:pPr algn="l"/>
             <a:r>
               <a:rPr lang="en-GB" sz="1300" dirty="0" err="1">
+                <a:latin typeface="Monaco" charset="0"/>
+                <a:ea typeface="Monaco" charset="0"/>
+                <a:cs typeface="Monaco" charset="0"/>
+              </a:rPr>
+              <a:t>data_corpus_inaugural</a:t>
+            </a:r>
+            <a:r>
+              <a:rPr lang="en-GB" sz="1300" dirty="0">
+                <a:latin typeface="Monaco" charset="0"/>
+                <a:ea typeface="Monaco" charset="0"/>
+                <a:cs typeface="Monaco" charset="0"/>
+              </a:rPr>
+              <a:t> %&gt;%   </a:t>
+            </a:r>
+          </a:p>
+          <a:p>
+            <a:pPr algn="l"/>
+            <a:r>
+              <a:rPr lang="en-GB" sz="1300" dirty="0">
+                <a:latin typeface="Monaco" charset="0"/>
+                <a:ea typeface="Monaco" charset="0"/>
+                <a:cs typeface="Monaco" charset="0"/>
+              </a:rPr>
+              <a:t>  </a:t>
+            </a:r>
+            <a:r>
+              <a:rPr lang="en-GB" sz="1300" dirty="0" err="1">
+                <a:solidFill>
+                  <a:srgbClr val="006AC7"/>
+                </a:solidFill>
+                <a:latin typeface="Monaco" charset="0"/>
+                <a:ea typeface="Monaco" charset="0"/>
+                <a:cs typeface="Monaco" charset="0"/>
+              </a:rPr>
+              <a:t>corpus_subset</a:t>
+            </a:r>
+            <a:r>
+              <a:rPr lang="en-GB" sz="1300" dirty="0">
+                <a:latin typeface="Monaco" charset="0"/>
+                <a:ea typeface="Monaco" charset="0"/>
+                <a:cs typeface="Monaco" charset="0"/>
+              </a:rPr>
+              <a:t>(President %in% </a:t>
+            </a:r>
+          </a:p>
+          <a:p>
+            <a:pPr algn="l"/>
+            <a:r>
+              <a:rPr lang="en-GB" sz="1300" dirty="0">
+                <a:latin typeface="Monaco" charset="0"/>
+                <a:ea typeface="Monaco" charset="0"/>
+                <a:cs typeface="Monaco" charset="0"/>
+              </a:rPr>
+              <a:t>  		    c("Obama", "Trump")) %&gt;%</a:t>
+            </a:r>
+          </a:p>
+          <a:p>
+            <a:pPr algn="l"/>
+            <a:r>
+              <a:rPr lang="en-GB" sz="1300" dirty="0">
+                <a:latin typeface="Monaco" charset="0"/>
+                <a:ea typeface="Monaco" charset="0"/>
+                <a:cs typeface="Monaco" charset="0"/>
+              </a:rPr>
+              <a:t>  </a:t>
+            </a:r>
+            <a:r>
+              <a:rPr lang="en-GB" sz="1300" dirty="0" err="1">
+                <a:solidFill>
+                  <a:srgbClr val="006AC7"/>
+                </a:solidFill>
+                <a:latin typeface="Monaco" charset="0"/>
+                <a:ea typeface="Monaco" charset="0"/>
+                <a:cs typeface="Monaco" charset="0"/>
+              </a:rPr>
+              <a:t>dfm</a:t>
+            </a:r>
+            <a:r>
+              <a:rPr lang="en-GB" sz="1300" dirty="0">
+                <a:latin typeface="Monaco" charset="0"/>
+                <a:ea typeface="Monaco" charset="0"/>
+                <a:cs typeface="Monaco" charset="0"/>
+              </a:rPr>
+              <a:t>(groups = "President", </a:t>
+            </a:r>
+          </a:p>
+          <a:p>
+            <a:pPr algn="l"/>
+            <a:r>
+              <a:rPr lang="en-GB" sz="1300" dirty="0">
+                <a:latin typeface="Monaco" charset="0"/>
+                <a:ea typeface="Monaco" charset="0"/>
+                <a:cs typeface="Monaco" charset="0"/>
+              </a:rPr>
+              <a:t>	remove = </a:t>
+            </a:r>
+            <a:r>
+              <a:rPr lang="en-GB" sz="1300" dirty="0" err="1">
                 <a:solidFill>
                   <a:schemeClr val="tx1"/>
                 </a:solidFill>
@@ -6874,18 +6778,31 @@
                 <a:ea typeface="Monaco" charset="0"/>
                 <a:cs typeface="Monaco" charset="0"/>
               </a:rPr>
-              <a:t>data_corpus_inaugural</a:t>
+              <a:t>stopwords</a:t>
             </a:r>
             <a:r>
               <a:rPr lang="en-GB" sz="1300" dirty="0">
-                <a:solidFill>
-                  <a:schemeClr val="tx1"/>
-                </a:solidFill>
-                <a:latin typeface="Monaco" charset="0"/>
-                <a:ea typeface="Monaco" charset="0"/>
-                <a:cs typeface="Monaco" charset="0"/>
-              </a:rPr>
-              <a:t> %&gt;%   </a:t>
+                <a:latin typeface="Monaco" charset="0"/>
+                <a:ea typeface="Monaco" charset="0"/>
+                <a:cs typeface="Monaco" charset="0"/>
+              </a:rPr>
+              <a:t>("</a:t>
+            </a:r>
+            <a:r>
+              <a:rPr lang="en-GB" sz="1300" dirty="0" err="1">
+                <a:latin typeface="Monaco" charset="0"/>
+                <a:ea typeface="Monaco" charset="0"/>
+                <a:cs typeface="Monaco" charset="0"/>
+              </a:rPr>
+              <a:t>english</a:t>
+            </a:r>
+            <a:r>
+              <a:rPr lang="en-GB" sz="1300" dirty="0">
+                <a:latin typeface="Monaco" charset="0"/>
+                <a:ea typeface="Monaco" charset="0"/>
+                <a:cs typeface="Monaco" charset="0"/>
+              </a:rPr>
+              <a:t>")) %&gt;%   </a:t>
             </a:r>
           </a:p>
           <a:p>
@@ -6893,7 +6810,7 @@
             <a:r>
               <a:rPr lang="en-GB" sz="1300" dirty="0">
                 <a:solidFill>
-                  <a:schemeClr val="tx1"/>
+                  <a:srgbClr val="006AC7"/>
                 </a:solidFill>
                 <a:latin typeface="Monaco" charset="0"/>
                 <a:ea typeface="Monaco" charset="0"/>
@@ -6910,18 +6827,15 @@
                 <a:ea typeface="Monaco" charset="0"/>
                 <a:cs typeface="Monaco" charset="0"/>
               </a:rPr>
-              <a:t>corpus_subset</a:t>
+              <a:t>textstat_keyness</a:t>
             </a:r>
             <a:r>
               <a:rPr lang="en-GB" sz="1300" dirty="0">
-                <a:solidFill>
-                  <a:schemeClr val="tx1"/>
-                </a:solidFill>
-                <a:latin typeface="Monaco" charset="0"/>
-                <a:ea typeface="Monaco" charset="0"/>
-                <a:cs typeface="Monaco" charset="0"/>
-              </a:rPr>
-              <a:t>(Year &gt; 1945) %&gt;%   </a:t>
+                <a:latin typeface="Monaco" charset="0"/>
+                <a:ea typeface="Monaco" charset="0"/>
+                <a:cs typeface="Monaco" charset="0"/>
+              </a:rPr>
+              <a:t>(target = "Trump") %&gt;%   </a:t>
             </a:r>
           </a:p>
           <a:p>
@@ -6929,7 +6843,7 @@
             <a:r>
               <a:rPr lang="en-GB" sz="1300" dirty="0">
                 <a:solidFill>
-                  <a:schemeClr val="tx1"/>
+                  <a:srgbClr val="006AC7"/>
                 </a:solidFill>
                 <a:latin typeface="Monaco" charset="0"/>
                 <a:ea typeface="Monaco" charset="0"/>
@@ -6946,85 +6860,16 @@
                 <a:ea typeface="Monaco" charset="0"/>
                 <a:cs typeface="Monaco" charset="0"/>
               </a:rPr>
-              <a:t>kwic</a:t>
+              <a:t>textplot_keyness</a:t>
             </a:r>
             <a:r>
               <a:rPr lang="en-GB" sz="1300" dirty="0">
-                <a:solidFill>
-                  <a:schemeClr val="tx1"/>
-                </a:solidFill>
-                <a:latin typeface="Monaco" charset="0"/>
-                <a:ea typeface="Monaco" charset="0"/>
-                <a:cs typeface="Monaco" charset="0"/>
-              </a:rPr>
-              <a:t>("</a:t>
-            </a:r>
-            <a:r>
-              <a:rPr lang="en-GB" sz="1300" dirty="0" err="1">
-                <a:solidFill>
-                  <a:schemeClr val="tx1"/>
-                </a:solidFill>
-                <a:latin typeface="Monaco" charset="0"/>
-                <a:ea typeface="Monaco" charset="0"/>
-                <a:cs typeface="Monaco" charset="0"/>
-              </a:rPr>
-              <a:t>american</a:t>
-            </a:r>
-            <a:r>
-              <a:rPr lang="en-GB" sz="1300" dirty="0">
-                <a:solidFill>
-                  <a:schemeClr val="tx1"/>
-                </a:solidFill>
-                <a:latin typeface="Monaco" charset="0"/>
-                <a:ea typeface="Monaco" charset="0"/>
-                <a:cs typeface="Monaco" charset="0"/>
-              </a:rPr>
-              <a:t>") %&gt;%   </a:t>
-            </a:r>
-          </a:p>
-          <a:p>
-            <a:pPr algn="l"/>
-            <a:r>
-              <a:rPr lang="en-GB" sz="1300" dirty="0">
-                <a:solidFill>
-                  <a:schemeClr val="tx1"/>
-                </a:solidFill>
-                <a:latin typeface="Monaco" charset="0"/>
-                <a:ea typeface="Monaco" charset="0"/>
-                <a:cs typeface="Monaco" charset="0"/>
-              </a:rPr>
-              <a:t>  </a:t>
-            </a:r>
-            <a:r>
-              <a:rPr lang="en-GB" sz="1300" dirty="0" err="1">
-                <a:solidFill>
-                  <a:srgbClr val="006AC7"/>
-                </a:solidFill>
-                <a:latin typeface="Monaco" charset="0"/>
-                <a:ea typeface="Monaco" charset="0"/>
-                <a:cs typeface="Monaco" charset="0"/>
-              </a:rPr>
-              <a:t>textplot_xray</a:t>
-            </a:r>
-            <a:r>
-              <a:rPr lang="en-GB" sz="1300" dirty="0">
-                <a:solidFill>
-                  <a:schemeClr val="tx1"/>
-                </a:solidFill>
                 <a:latin typeface="Monaco" charset="0"/>
                 <a:ea typeface="Monaco" charset="0"/>
                 <a:cs typeface="Monaco" charset="0"/>
               </a:rPr>
               <a:t>()</a:t>
             </a:r>
-            <a:endParaRPr lang="en-GB" sz="1300" dirty="0">
-              <a:solidFill>
-                <a:schemeClr val="tx1"/>
-              </a:solidFill>
-              <a:latin typeface="Source Sans Pro" charset="0"/>
-              <a:ea typeface="Source Sans Pro" charset="0"/>
-              <a:cs typeface="Source Sans Pro" charset="0"/>
-            </a:endParaRPr>
           </a:p>
           <a:p>
             <a:pPr algn="l"/>
@@ -7042,7 +6887,7 @@
                 <a:ea typeface="Source Sans Pro" charset="0"/>
                 <a:cs typeface="Source Sans Pro" charset="0"/>
               </a:rPr>
-              <a:t>Plot word </a:t>
+              <a:t>Plot </a:t>
             </a:r>
             <a:r>
               <a:rPr lang="en-GB" sz="1500" b="1" dirty="0" err="1">
@@ -7050,266 +6895,64 @@
                 <a:ea typeface="Source Sans Pro" charset="0"/>
                 <a:cs typeface="Source Sans Pro" charset="0"/>
               </a:rPr>
-              <a:t>keyness</a:t>
-            </a:r>
-            <a:endParaRPr lang="en-GB" sz="1500" dirty="0">
+              <a:t>Wordfish</a:t>
+            </a:r>
+            <a:r>
+              <a:rPr lang="en-GB" sz="1500" b="1" dirty="0">
+                <a:latin typeface="Source Sans Pro" charset="0"/>
+                <a:ea typeface="Source Sans Pro" charset="0"/>
+                <a:cs typeface="Source Sans Pro" charset="0"/>
+              </a:rPr>
+              <a:t>, </a:t>
+            </a:r>
+            <a:r>
+              <a:rPr lang="en-GB" sz="1500" b="1" dirty="0" err="1">
+                <a:latin typeface="Source Sans Pro" charset="0"/>
+                <a:ea typeface="Source Sans Pro" charset="0"/>
+                <a:cs typeface="Source Sans Pro" charset="0"/>
+              </a:rPr>
+              <a:t>Wordscores</a:t>
+            </a:r>
+            <a:r>
+              <a:rPr lang="en-GB" sz="1500" b="1" dirty="0">
+                <a:latin typeface="Source Sans Pro" charset="0"/>
+                <a:ea typeface="Source Sans Pro" charset="0"/>
+                <a:cs typeface="Source Sans Pro" charset="0"/>
+              </a:rPr>
+              <a:t> or CA models </a:t>
+            </a:r>
+          </a:p>
+          <a:p>
+            <a:pPr algn="l"/>
+            <a:r>
+              <a:rPr lang="en-GB" sz="1500" dirty="0">
+                <a:latin typeface="Source Sans Pro" charset="0"/>
+                <a:ea typeface="Source Sans Pro" charset="0"/>
+                <a:cs typeface="Source Sans Pro" charset="0"/>
+              </a:rPr>
+              <a:t>(requires the </a:t>
+            </a:r>
+            <a:r>
+              <a:rPr lang="en-GB" sz="1500" b="1" dirty="0" err="1">
+                <a:latin typeface="Source Sans Pro" charset="0"/>
+                <a:ea typeface="Source Sans Pro" charset="0"/>
+                <a:cs typeface="Source Sans Pro" charset="0"/>
+              </a:rPr>
+              <a:t>quanteda.textmodels</a:t>
+            </a:r>
+            <a:r>
+              <a:rPr lang="en-GB" sz="1500" dirty="0">
+                <a:latin typeface="Source Sans Pro" charset="0"/>
+                <a:ea typeface="Source Sans Pro" charset="0"/>
+                <a:cs typeface="Source Sans Pro" charset="0"/>
+              </a:rPr>
+              <a:t> package)</a:t>
+            </a:r>
+            <a:endParaRPr lang="en-GB" sz="1500" b="1" dirty="0">
               <a:latin typeface="Source Sans Pro" charset="0"/>
               <a:ea typeface="Source Sans Pro" charset="0"/>
               <a:cs typeface="Source Sans Pro" charset="0"/>
             </a:endParaRPr>
-          </a:p>
-          <a:p>
-            <a:pPr algn="l"/>
-            <a:r>
-              <a:rPr lang="en-GB" sz="1300" dirty="0" err="1">
-                <a:latin typeface="Monaco" charset="0"/>
-                <a:ea typeface="Monaco" charset="0"/>
-                <a:cs typeface="Monaco" charset="0"/>
-              </a:rPr>
-              <a:t>data_corpus_inaugural</a:t>
-            </a:r>
-            <a:r>
-              <a:rPr lang="en-GB" sz="1300" dirty="0">
-                <a:latin typeface="Monaco" charset="0"/>
-                <a:ea typeface="Monaco" charset="0"/>
-                <a:cs typeface="Monaco" charset="0"/>
-              </a:rPr>
-              <a:t> %&gt;%   </a:t>
-            </a:r>
-          </a:p>
-          <a:p>
-            <a:pPr algn="l"/>
-            <a:r>
-              <a:rPr lang="en-GB" sz="1300" dirty="0">
-                <a:latin typeface="Monaco" charset="0"/>
-                <a:ea typeface="Monaco" charset="0"/>
-                <a:cs typeface="Monaco" charset="0"/>
-              </a:rPr>
-              <a:t>  </a:t>
-            </a:r>
-            <a:r>
-              <a:rPr lang="en-GB" sz="1300" dirty="0" err="1">
-                <a:solidFill>
-                  <a:srgbClr val="006AC7"/>
-                </a:solidFill>
-                <a:latin typeface="Monaco" charset="0"/>
-                <a:ea typeface="Monaco" charset="0"/>
-                <a:cs typeface="Monaco" charset="0"/>
-              </a:rPr>
-              <a:t>corpus_subset</a:t>
-            </a:r>
-            <a:r>
-              <a:rPr lang="en-GB" sz="1300" dirty="0">
-                <a:latin typeface="Monaco" charset="0"/>
-                <a:ea typeface="Monaco" charset="0"/>
-                <a:cs typeface="Monaco" charset="0"/>
-              </a:rPr>
-              <a:t>(President %in% </a:t>
-            </a:r>
-          </a:p>
-          <a:p>
-            <a:pPr algn="l"/>
-            <a:r>
-              <a:rPr lang="en-GB" sz="1300" dirty="0">
-                <a:latin typeface="Monaco" charset="0"/>
-                <a:ea typeface="Monaco" charset="0"/>
-                <a:cs typeface="Monaco" charset="0"/>
-              </a:rPr>
-              <a:t>  		    c("Obama", "Trump")) %&gt;%</a:t>
-            </a:r>
-          </a:p>
-          <a:p>
-            <a:pPr algn="l"/>
-            <a:r>
-              <a:rPr lang="en-GB" sz="1300" dirty="0">
-                <a:latin typeface="Monaco" charset="0"/>
-                <a:ea typeface="Monaco" charset="0"/>
-                <a:cs typeface="Monaco" charset="0"/>
-              </a:rPr>
-              <a:t>  </a:t>
-            </a:r>
-            <a:r>
-              <a:rPr lang="en-GB" sz="1300" dirty="0" err="1">
-                <a:solidFill>
-                  <a:srgbClr val="006AC7"/>
-                </a:solidFill>
-                <a:latin typeface="Monaco" charset="0"/>
-                <a:ea typeface="Monaco" charset="0"/>
-                <a:cs typeface="Monaco" charset="0"/>
-              </a:rPr>
-              <a:t>dfm</a:t>
-            </a:r>
-            <a:r>
-              <a:rPr lang="en-GB" sz="1300" dirty="0">
-                <a:latin typeface="Monaco" charset="0"/>
-                <a:ea typeface="Monaco" charset="0"/>
-                <a:cs typeface="Monaco" charset="0"/>
-              </a:rPr>
-              <a:t>(groups = "President", </a:t>
-            </a:r>
-          </a:p>
-          <a:p>
-            <a:pPr algn="l"/>
-            <a:r>
-              <a:rPr lang="en-GB" sz="1300" dirty="0">
-                <a:latin typeface="Monaco" charset="0"/>
-                <a:ea typeface="Monaco" charset="0"/>
-                <a:cs typeface="Monaco" charset="0"/>
-              </a:rPr>
-              <a:t>	remove = </a:t>
-            </a:r>
-            <a:r>
-              <a:rPr lang="en-GB" sz="1300" dirty="0" err="1">
-                <a:solidFill>
-                  <a:schemeClr val="tx1"/>
-                </a:solidFill>
-                <a:latin typeface="Monaco" charset="0"/>
-                <a:ea typeface="Monaco" charset="0"/>
-                <a:cs typeface="Monaco" charset="0"/>
-              </a:rPr>
-              <a:t>stopwords</a:t>
-            </a:r>
-            <a:r>
-              <a:rPr lang="en-GB" sz="1300" dirty="0">
-                <a:latin typeface="Monaco" charset="0"/>
-                <a:ea typeface="Monaco" charset="0"/>
-                <a:cs typeface="Monaco" charset="0"/>
-              </a:rPr>
-              <a:t>("</a:t>
-            </a:r>
-            <a:r>
-              <a:rPr lang="en-GB" sz="1300" dirty="0" err="1">
-                <a:latin typeface="Monaco" charset="0"/>
-                <a:ea typeface="Monaco" charset="0"/>
-                <a:cs typeface="Monaco" charset="0"/>
-              </a:rPr>
-              <a:t>english</a:t>
-            </a:r>
-            <a:r>
-              <a:rPr lang="en-GB" sz="1300" dirty="0">
-                <a:latin typeface="Monaco" charset="0"/>
-                <a:ea typeface="Monaco" charset="0"/>
-                <a:cs typeface="Monaco" charset="0"/>
-              </a:rPr>
-              <a:t>")) %&gt;%   </a:t>
-            </a:r>
-          </a:p>
-          <a:p>
-            <a:pPr algn="l"/>
-            <a:r>
-              <a:rPr lang="en-GB" sz="1300" dirty="0">
-                <a:solidFill>
-                  <a:srgbClr val="006AC7"/>
-                </a:solidFill>
-                <a:latin typeface="Monaco" charset="0"/>
-                <a:ea typeface="Monaco" charset="0"/>
-                <a:cs typeface="Monaco" charset="0"/>
-              </a:rPr>
-              <a:t>  </a:t>
-            </a:r>
-            <a:r>
-              <a:rPr lang="en-GB" sz="1300" dirty="0" err="1">
-                <a:solidFill>
-                  <a:srgbClr val="006AC7"/>
-                </a:solidFill>
-                <a:latin typeface="Monaco" charset="0"/>
-                <a:ea typeface="Monaco" charset="0"/>
-                <a:cs typeface="Monaco" charset="0"/>
-              </a:rPr>
-              <a:t>textstat_keyness</a:t>
-            </a:r>
-            <a:r>
-              <a:rPr lang="en-GB" sz="1300" dirty="0">
-                <a:latin typeface="Monaco" charset="0"/>
-                <a:ea typeface="Monaco" charset="0"/>
-                <a:cs typeface="Monaco" charset="0"/>
-              </a:rPr>
-              <a:t>(target = "Trump") %&gt;%   </a:t>
-            </a:r>
-          </a:p>
-          <a:p>
-            <a:pPr algn="l"/>
-            <a:r>
-              <a:rPr lang="en-GB" sz="1300" dirty="0">
-                <a:solidFill>
-                  <a:srgbClr val="006AC7"/>
-                </a:solidFill>
-                <a:latin typeface="Monaco" charset="0"/>
-                <a:ea typeface="Monaco" charset="0"/>
-                <a:cs typeface="Monaco" charset="0"/>
-              </a:rPr>
-              <a:t>  </a:t>
-            </a:r>
-            <a:r>
-              <a:rPr lang="en-GB" sz="1300" dirty="0" err="1">
-                <a:solidFill>
-                  <a:srgbClr val="006AC7"/>
-                </a:solidFill>
-                <a:latin typeface="Monaco" charset="0"/>
-                <a:ea typeface="Monaco" charset="0"/>
-                <a:cs typeface="Monaco" charset="0"/>
-              </a:rPr>
-              <a:t>textplot_keyness</a:t>
-            </a:r>
-            <a:r>
-              <a:rPr lang="en-GB" sz="1300" dirty="0">
-                <a:latin typeface="Monaco" charset="0"/>
-                <a:ea typeface="Monaco" charset="0"/>
-                <a:cs typeface="Monaco" charset="0"/>
-              </a:rPr>
-              <a:t>()</a:t>
-            </a:r>
-          </a:p>
-          <a:p>
-            <a:pPr algn="l"/>
-            <a:endParaRPr lang="en-GB" sz="1300" b="1" dirty="0">
-              <a:latin typeface="Source Sans Pro" charset="0"/>
-              <a:ea typeface="Source Sans Pro" charset="0"/>
-              <a:cs typeface="Source Sans Pro" charset="0"/>
-            </a:endParaRPr>
-          </a:p>
-          <a:p>
-            <a:pPr algn="l"/>
-            <a:r>
-              <a:rPr lang="en-GB" sz="1500" b="1" dirty="0">
-                <a:latin typeface="Source Sans Pro" charset="0"/>
-                <a:ea typeface="Source Sans Pro" charset="0"/>
-                <a:cs typeface="Source Sans Pro" charset="0"/>
-              </a:rPr>
-              <a:t>Plot </a:t>
-            </a:r>
-            <a:r>
-              <a:rPr lang="en-GB" sz="1500" b="1" dirty="0" err="1">
-                <a:latin typeface="Source Sans Pro" charset="0"/>
-                <a:ea typeface="Source Sans Pro" charset="0"/>
-                <a:cs typeface="Source Sans Pro" charset="0"/>
-              </a:rPr>
-              <a:t>Wordfish</a:t>
-            </a:r>
-            <a:r>
-              <a:rPr lang="en-GB" sz="1500" b="1" dirty="0">
-                <a:latin typeface="Source Sans Pro" charset="0"/>
-                <a:ea typeface="Source Sans Pro" charset="0"/>
-                <a:cs typeface="Source Sans Pro" charset="0"/>
-              </a:rPr>
-              <a:t>, </a:t>
-            </a:r>
-            <a:r>
-              <a:rPr lang="en-GB" sz="1500" b="1" dirty="0" err="1">
-                <a:latin typeface="Source Sans Pro" charset="0"/>
-                <a:ea typeface="Source Sans Pro" charset="0"/>
-                <a:cs typeface="Source Sans Pro" charset="0"/>
-              </a:rPr>
-              <a:t>Wordscores</a:t>
-            </a:r>
-            <a:r>
-              <a:rPr lang="en-GB" sz="1500" b="1" dirty="0">
-                <a:latin typeface="Source Sans Pro" charset="0"/>
-                <a:ea typeface="Source Sans Pro" charset="0"/>
-                <a:cs typeface="Source Sans Pro" charset="0"/>
-              </a:rPr>
-              <a:t> or CA models</a:t>
-            </a:r>
           </a:p>
           <a:p>
             <a:pPr algn="l"/>
@@ -7397,7 +7040,7 @@
         </p:nvSpPr>
         <p:spPr>
           <a:xfrm>
-            <a:off x="288186" y="5691758"/>
+            <a:off x="289478" y="5412621"/>
             <a:ext cx="6265777" cy="3698448"/>
           </a:xfrm>
           <a:prstGeom prst="rect">
@@ -7986,7 +7629,7 @@
         </p:nvSpPr>
         <p:spPr>
           <a:xfrm>
-            <a:off x="247836" y="5630971"/>
+            <a:off x="249128" y="5351834"/>
             <a:ext cx="6084291" cy="184666"/>
           </a:xfrm>
           <a:prstGeom prst="rect">
@@ -8027,7 +7670,7 @@
         </p:nvSpPr>
         <p:spPr>
           <a:xfrm>
-            <a:off x="131672" y="5023173"/>
+            <a:off x="132964" y="4744036"/>
             <a:ext cx="6436800" cy="482886"/>
           </a:xfrm>
           <a:prstGeom prst="roundRect">
@@ -8113,7 +7756,211 @@
         </p:nvSpPr>
         <p:spPr>
           <a:xfrm>
-            <a:off x="6647804" y="196471"/>
+            <a:off x="6647804" y="196470"/>
+            <a:ext cx="7253999" cy="858643"/>
+          </a:xfrm>
+          <a:prstGeom prst="roundRect">
+            <a:avLst>
+              <a:gd name="adj" fmla="val 20098"/>
+            </a:avLst>
+          </a:prstGeom>
+          <a:solidFill>
+            <a:srgbClr val="006AC7"/>
+          </a:solidFill>
+          <a:ln w="12700">
+            <a:miter lim="400000"/>
+          </a:ln>
+          <a:extLst>
+            <a:ext uri="{C572A759-6A51-4108-AA02-DFA0A04FC94B}">
+              <ma14:wrappingTextBoxFlag xmlns:ma14="http://schemas.microsoft.com/office/mac/drawingml/2011/main" xmlns="" val="1"/>
+            </a:ext>
+          </a:extLst>
+        </p:spPr>
+        <p:txBody>
+          <a:bodyPr lIns="0" tIns="0" rIns="0" bIns="0" anchor="ctr"/>
+          <a:lstStyle/>
+          <a:p>
+            <a:pPr lvl="1" indent="0">
+              <a:defRPr sz="1800"/>
+            </a:pPr>
+            <a:r>
+              <a:rPr lang="en-US" sz="2400" dirty="0">
+                <a:solidFill>
+                  <a:srgbClr val="FFFFFF"/>
+                </a:solidFill>
+                <a:latin typeface="Source Sans Pro"/>
+                <a:ea typeface="Source Sans Pro"/>
+                <a:cs typeface="Source Sans Pro"/>
+                <a:sym typeface="Source Sans Pro"/>
+              </a:rPr>
+              <a:t>Fit text models based on a </a:t>
+            </a:r>
+            <a:r>
+              <a:rPr lang="en-US" sz="2400" dirty="0" err="1">
+                <a:solidFill>
+                  <a:srgbClr val="FFFFFF"/>
+                </a:solidFill>
+                <a:latin typeface="Source Sans Pro"/>
+                <a:ea typeface="Source Sans Pro"/>
+                <a:cs typeface="Source Sans Pro"/>
+                <a:sym typeface="Source Sans Pro"/>
+              </a:rPr>
+              <a:t>dfm</a:t>
+            </a:r>
+            <a:r>
+              <a:rPr lang="en-US" sz="2400" dirty="0">
+                <a:solidFill>
+                  <a:srgbClr val="FFFFFF"/>
+                </a:solidFill>
+                <a:latin typeface="Source Sans Pro"/>
+                <a:ea typeface="Source Sans Pro"/>
+                <a:cs typeface="Source Sans Pro"/>
+                <a:sym typeface="Source Sans Pro"/>
+              </a:rPr>
+              <a:t> (</a:t>
+            </a:r>
+            <a:r>
+              <a:rPr lang="en-US" sz="2000" dirty="0" err="1">
+                <a:solidFill>
+                  <a:srgbClr val="FFFFFF"/>
+                </a:solidFill>
+                <a:latin typeface="Monaco" charset="0"/>
+                <a:ea typeface="Monaco" charset="0"/>
+                <a:cs typeface="Monaco" charset="0"/>
+                <a:sym typeface="Source Sans Pro"/>
+              </a:rPr>
+              <a:t>textmodel</a:t>
+            </a:r>
+            <a:r>
+              <a:rPr lang="en-US" sz="2000" dirty="0">
+                <a:solidFill>
+                  <a:srgbClr val="FFFFFF"/>
+                </a:solidFill>
+                <a:latin typeface="Monaco" charset="0"/>
+                <a:ea typeface="Monaco" charset="0"/>
+                <a:cs typeface="Monaco" charset="0"/>
+                <a:sym typeface="Source Sans Pro"/>
+              </a:rPr>
+              <a:t>_*</a:t>
+            </a:r>
+            <a:r>
+              <a:rPr lang="en-US" sz="2400" dirty="0">
+                <a:solidFill>
+                  <a:srgbClr val="FFFFFF"/>
+                </a:solidFill>
+                <a:latin typeface="Source Sans Pro"/>
+                <a:ea typeface="Source Sans Pro"/>
+                <a:cs typeface="Source Sans Pro"/>
+                <a:sym typeface="Source Sans Pro"/>
+              </a:rPr>
+              <a:t>)</a:t>
+            </a:r>
+          </a:p>
+          <a:p>
+            <a:pPr lvl="1" indent="0">
+              <a:defRPr sz="1800"/>
+            </a:pPr>
+            <a:r>
+              <a:rPr lang="en-US" sz="1400" i="1" dirty="0">
+                <a:solidFill>
+                  <a:srgbClr val="FFFFFF"/>
+                </a:solidFill>
+                <a:latin typeface="Source Sans Pro"/>
+                <a:ea typeface="Source Sans Pro"/>
+                <a:cs typeface="Source Sans Pro"/>
+                <a:sym typeface="Source Sans Pro"/>
+              </a:rPr>
+              <a:t>These functions require the </a:t>
+            </a:r>
+            <a:r>
+              <a:rPr lang="en-US" sz="1400" b="1" dirty="0" err="1">
+                <a:solidFill>
+                  <a:srgbClr val="FFFFFF"/>
+                </a:solidFill>
+                <a:latin typeface="Source Sans Pro"/>
+                <a:ea typeface="Source Sans Pro"/>
+                <a:cs typeface="Source Sans Pro"/>
+                <a:sym typeface="Source Sans Pro"/>
+              </a:rPr>
+              <a:t>quanteda.textmodels</a:t>
+            </a:r>
+            <a:r>
+              <a:rPr lang="en-US" sz="1400" b="1" dirty="0">
+                <a:solidFill>
+                  <a:srgbClr val="FFFFFF"/>
+                </a:solidFill>
+                <a:latin typeface="Source Sans Pro"/>
+                <a:ea typeface="Source Sans Pro"/>
+                <a:cs typeface="Source Sans Pro"/>
+                <a:sym typeface="Source Sans Pro"/>
+              </a:rPr>
+              <a:t> </a:t>
+            </a:r>
+            <a:r>
+              <a:rPr lang="en-US" sz="1400" i="1" dirty="0">
+                <a:solidFill>
+                  <a:srgbClr val="FFFFFF"/>
+                </a:solidFill>
+                <a:latin typeface="Source Sans Pro"/>
+                <a:ea typeface="Source Sans Pro"/>
+                <a:cs typeface="Source Sans Pro"/>
+                <a:sym typeface="Source Sans Pro"/>
+              </a:rPr>
+              <a:t>package</a:t>
+            </a:r>
+          </a:p>
+        </p:txBody>
+      </p:sp>
+      <p:sp>
+        <p:nvSpPr>
+          <p:cNvPr id="53" name="Shape 35"/>
+          <p:cNvSpPr/>
+          <p:nvPr/>
+        </p:nvSpPr>
+        <p:spPr>
+          <a:xfrm>
+            <a:off x="6809909" y="6487781"/>
+            <a:ext cx="6836713" cy="184666"/>
+          </a:xfrm>
+          <a:prstGeom prst="rect">
+            <a:avLst/>
+          </a:prstGeom>
+          <a:ln w="12700">
+            <a:miter lim="400000"/>
+          </a:ln>
+          <a:extLst>
+            <a:ext uri="{C572A759-6A51-4108-AA02-DFA0A04FC94B}">
+              <ma14:wrappingTextBoxFlag xmlns:ma14="http://schemas.microsoft.com/office/mac/drawingml/2011/main" xmlns="" val="1"/>
+            </a:ext>
+          </a:extLst>
+        </p:spPr>
+        <p:txBody>
+          <a:bodyPr wrap="square" lIns="0" tIns="0" rIns="0" bIns="0">
+            <a:spAutoFit/>
+          </a:bodyPr>
+          <a:lstStyle/>
+          <a:p>
+            <a:pPr algn="l"/>
+            <a:endParaRPr lang="en-GB" sz="1200" b="1" i="1">
+              <a:solidFill>
+                <a:srgbClr val="006AC7"/>
+              </a:solidFill>
+              <a:latin typeface="Source Sans Pro" charset="0"/>
+              <a:ea typeface="Source Sans Pro" charset="0"/>
+              <a:cs typeface="Source Sans Pro" charset="0"/>
+            </a:endParaRPr>
+          </a:p>
+        </p:txBody>
+      </p:sp>
+      <p:sp>
+        <p:nvSpPr>
+          <p:cNvPr id="55" name="Shape 38"/>
+          <p:cNvSpPr/>
+          <p:nvPr/>
+        </p:nvSpPr>
+        <p:spPr>
+          <a:xfrm>
+            <a:off x="6640309" y="4734386"/>
             <a:ext cx="7253999" cy="482886"/>
           </a:xfrm>
           <a:prstGeom prst="roundRect">
@@ -8150,10 +7997,34 @@
                 <a:cs typeface="Source Sans Pro"/>
                 <a:sym typeface="Source Sans Pro"/>
               </a:rPr>
-              <a:t>Fit text models based on a </a:t>
-            </a:r>
-            <a:r>
-              <a:rPr lang="en-US" sz="2400" dirty="0" err="1">
+              <a:t>Plot features or models (</a:t>
+            </a:r>
+            <a:r>
+              <a:rPr lang="en-US" sz="2000" dirty="0" err="1">
+                <a:solidFill>
+                  <a:srgbClr val="FFFFFF"/>
+                </a:solidFill>
+                <a:latin typeface="Monaco" charset="0"/>
+                <a:ea typeface="Monaco" charset="0"/>
+                <a:cs typeface="Monaco" charset="0"/>
+                <a:sym typeface="Source Sans Pro"/>
+              </a:rPr>
+              <a:t>textplot</a:t>
+            </a:r>
+            <a:r>
+              <a:rPr lang="en-US" sz="2000" dirty="0">
+                <a:solidFill>
+                  <a:srgbClr val="FFFFFF"/>
+                </a:solidFill>
+                <a:latin typeface="Monaco" charset="0"/>
+                <a:ea typeface="Monaco" charset="0"/>
+                <a:cs typeface="Monaco" charset="0"/>
+                <a:sym typeface="Source Sans Pro"/>
+              </a:rPr>
+              <a:t>_*</a:t>
+            </a:r>
+            <a:r>
+              <a:rPr lang="en-US" sz="2400" dirty="0">
                 <a:solidFill>
                   <a:srgbClr val="FFFFFF"/>
                 </a:solidFill>
@@ -8162,196 +8033,50 @@
                 <a:cs typeface="Source Sans Pro"/>
                 <a:sym typeface="Source Sans Pro"/>
               </a:rPr>
-              <a:t>dfm</a:t>
-            </a:r>
-            <a:r>
-              <a:rPr lang="en-US" sz="2400" dirty="0">
-                <a:solidFill>
-                  <a:srgbClr val="FFFFFF"/>
-                </a:solidFill>
-                <a:latin typeface="Source Sans Pro"/>
-                <a:ea typeface="Source Sans Pro"/>
-                <a:cs typeface="Source Sans Pro"/>
-                <a:sym typeface="Source Sans Pro"/>
-              </a:rPr>
-              <a:t> (</a:t>
-            </a:r>
-            <a:r>
-              <a:rPr lang="en-US" sz="2000" dirty="0" err="1">
-                <a:solidFill>
-                  <a:srgbClr val="FFFFFF"/>
-                </a:solidFill>
-                <a:latin typeface="Monaco" charset="0"/>
-                <a:ea typeface="Monaco" charset="0"/>
-                <a:cs typeface="Monaco" charset="0"/>
-                <a:sym typeface="Source Sans Pro"/>
-              </a:rPr>
-              <a:t>textmodel</a:t>
-            </a:r>
-            <a:r>
-              <a:rPr lang="en-US" sz="2000" dirty="0">
-                <a:solidFill>
-                  <a:srgbClr val="FFFFFF"/>
-                </a:solidFill>
-                <a:latin typeface="Monaco" charset="0"/>
-                <a:ea typeface="Monaco" charset="0"/>
-                <a:cs typeface="Monaco" charset="0"/>
-                <a:sym typeface="Source Sans Pro"/>
-              </a:rPr>
-              <a:t>_*</a:t>
-            </a:r>
-            <a:r>
-              <a:rPr lang="en-US" sz="2400" dirty="0">
-                <a:solidFill>
-                  <a:srgbClr val="FFFFFF"/>
-                </a:solidFill>
-                <a:latin typeface="Source Sans Pro"/>
-                <a:ea typeface="Source Sans Pro"/>
-                <a:cs typeface="Source Sans Pro"/>
-                <a:sym typeface="Source Sans Pro"/>
-              </a:rPr>
               <a:t>)</a:t>
             </a:r>
           </a:p>
         </p:txBody>
       </p:sp>
-      <p:sp>
-        <p:nvSpPr>
-          <p:cNvPr id="53" name="Shape 35"/>
-          <p:cNvSpPr/>
+      <p:pic>
+        <p:nvPicPr>
+          <p:cNvPr id="58" name="Picture 57"/>
+          <p:cNvPicPr>
+            <a:picLocks noChangeAspect="1"/>
+          </p:cNvPicPr>
           <p:nvPr/>
-        </p:nvSpPr>
+        </p:nvPicPr>
+        <p:blipFill rotWithShape="1">
+          <a:blip r:embed="rId3">
+            <a:extLst>
+              <a:ext uri="{28A0092B-C50C-407E-A947-70E740481C1C}">
+                <a14:useLocalDpi xmlns:a14="http://schemas.microsoft.com/office/drawing/2010/main" val="0"/>
+              </a:ext>
+            </a:extLst>
+          </a:blip>
+          <a:srcRect l="25138" t="26147" r="25661" b="24848"/>
+          <a:stretch/>
+        </p:blipFill>
         <p:spPr>
           <a:xfrm>
-            <a:off x="6809909" y="5417535"/>
-            <a:ext cx="6836713" cy="184666"/>
+            <a:off x="11963411" y="5208301"/>
+            <a:ext cx="1328655" cy="1323367"/>
           </a:xfrm>
           <a:prstGeom prst="rect">
             <a:avLst/>
           </a:prstGeom>
-          <a:ln w="12700">
-            <a:miter lim="400000"/>
-          </a:ln>
-          <a:extLst>
-            <a:ext uri="{C572A759-6A51-4108-AA02-DFA0A04FC94B}">
-              <ma14:wrappingTextBoxFlag xmlns:ma14="http://schemas.microsoft.com/office/mac/drawingml/2011/main" xmlns="" val="1"/>
-            </a:ext>
-          </a:extLst>
         </p:spPr>
-        <p:txBody>
-          <a:bodyPr wrap="square" lIns="0" tIns="0" rIns="0" bIns="0">
-            <a:spAutoFit/>
-          </a:bodyPr>
-          <a:lstStyle/>
-          <a:p>
-            <a:pPr algn="l"/>
-            <a:endParaRPr lang="en-GB" sz="1200" b="1" i="1">
-              <a:solidFill>
-                <a:srgbClr val="006AC7"/>
-              </a:solidFill>
-              <a:latin typeface="Source Sans Pro" charset="0"/>
-              <a:ea typeface="Source Sans Pro" charset="0"/>
-              <a:cs typeface="Source Sans Pro" charset="0"/>
-            </a:endParaRPr>
-          </a:p>
-        </p:txBody>
-      </p:sp>
-      <p:sp>
-        <p:nvSpPr>
-          <p:cNvPr id="55" name="Shape 38"/>
-          <p:cNvSpPr/>
-          <p:nvPr/>
-        </p:nvSpPr>
-        <p:spPr>
-          <a:xfrm>
-            <a:off x="6640309" y="3664140"/>
-            <a:ext cx="7253999" cy="482886"/>
-          </a:xfrm>
-          <a:prstGeom prst="roundRect">
-            <a:avLst>
-              <a:gd name="adj" fmla="val 20098"/>
-            </a:avLst>
-          </a:prstGeom>
-          <a:solidFill>
-            <a:srgbClr val="006AC7"/>
-          </a:solidFill>
-          <a:ln w="12700">
-            <a:miter lim="400000"/>
-          </a:ln>
-          <a:extLst>
-            <a:ext uri="{C572A759-6A51-4108-AA02-DFA0A04FC94B}">
-              <ma14:wrappingTextBoxFlag xmlns:ma14="http://schemas.microsoft.com/office/mac/drawingml/2011/main" xmlns="" val="1"/>
-            </a:ext>
-          </a:extLst>
-        </p:spPr>
-        <p:txBody>
-          <a:bodyPr lIns="0" tIns="0" rIns="0" bIns="0" anchor="ctr"/>
-          <a:lstStyle/>
-          <a:p>
-            <a:pPr lvl="1" indent="0">
-              <a:defRPr sz="1800"/>
-            </a:pPr>
-            <a:r>
-              <a:rPr lang="en-US" sz="2400" dirty="0">
-                <a:solidFill>
-                  <a:srgbClr val="FFFFFF"/>
-                </a:solidFill>
-                <a:latin typeface="Source Sans Pro"/>
-                <a:ea typeface="Source Sans Pro"/>
-                <a:cs typeface="Source Sans Pro"/>
-                <a:sym typeface="Source Sans Pro"/>
-              </a:rPr>
-              <a:t>Plot features or models (</a:t>
-            </a:r>
-            <a:r>
-              <a:rPr lang="en-US" sz="2000" dirty="0" err="1">
-                <a:solidFill>
-                  <a:srgbClr val="FFFFFF"/>
-                </a:solidFill>
-                <a:latin typeface="Monaco" charset="0"/>
-                <a:ea typeface="Monaco" charset="0"/>
-                <a:cs typeface="Monaco" charset="0"/>
-                <a:sym typeface="Source Sans Pro"/>
-              </a:rPr>
-              <a:t>textplot</a:t>
-            </a:r>
-            <a:r>
-              <a:rPr lang="en-US" sz="2000" dirty="0">
-                <a:solidFill>
-                  <a:srgbClr val="FFFFFF"/>
-                </a:solidFill>
-                <a:latin typeface="Monaco" charset="0"/>
-                <a:ea typeface="Monaco" charset="0"/>
-                <a:cs typeface="Monaco" charset="0"/>
-                <a:sym typeface="Source Sans Pro"/>
-              </a:rPr>
-              <a:t>_*</a:t>
-            </a:r>
-            <a:r>
-              <a:rPr lang="en-US" sz="2400" dirty="0">
-                <a:solidFill>
-                  <a:srgbClr val="FFFFFF"/>
-                </a:solidFill>
-                <a:latin typeface="Source Sans Pro"/>
-                <a:ea typeface="Source Sans Pro"/>
-                <a:cs typeface="Source Sans Pro"/>
-                <a:sym typeface="Source Sans Pro"/>
-              </a:rPr>
-              <a:t>)</a:t>
-            </a:r>
-          </a:p>
-        </p:txBody>
-      </p:sp>
+      </p:pic>
       <p:pic>
         <p:nvPicPr>
-          <p:cNvPr id="57" name="Picture 56"/>
+          <p:cNvPr id="59" name="Picture 58"/>
           <p:cNvPicPr>
             <a:picLocks noChangeAspect="1"/>
           </p:cNvPicPr>
           <p:nvPr/>
         </p:nvPicPr>
         <p:blipFill>
-          <a:blip r:embed="rId3">
+          <a:blip r:embed="rId4">
             <a:extLst>
               <a:ext uri="{28A0092B-C50C-407E-A947-70E740481C1C}">
                 <a14:useLocalDpi xmlns:a14="http://schemas.microsoft.com/office/drawing/2010/main" val="0"/>
@@ -8364,8 +8089,8 @@
         </p:blipFill>
         <p:spPr>
           <a:xfrm>
-            <a:off x="11814893" y="5436429"/>
-            <a:ext cx="1809004" cy="1356753"/>
+            <a:off x="11865450" y="6753019"/>
+            <a:ext cx="1902384" cy="1188990"/>
           </a:xfrm>
           <a:prstGeom prst="rect">
             <a:avLst/>
@@ -8374,36 +8099,7 @@
       </p:pic>
       <p:pic>
         <p:nvPicPr>
-          <p:cNvPr id="58" name="Picture 57"/>
-          <p:cNvPicPr>
-            <a:picLocks noChangeAspect="1"/>
-          </p:cNvPicPr>
-          <p:nvPr/>
-        </p:nvPicPr>
-        <p:blipFill rotWithShape="1">
-          <a:blip r:embed="rId4">
-            <a:extLst>
-              <a:ext uri="{28A0092B-C50C-407E-A947-70E740481C1C}">
-                <a14:useLocalDpi xmlns:a14="http://schemas.microsoft.com/office/drawing/2010/main" val="0"/>
-              </a:ext>
-            </a:extLst>
-          </a:blip>
-          <a:srcRect l="25138" t="26147" r="25661" b="24848"/>
-          <a:stretch/>
-        </p:blipFill>
-        <p:spPr>
-          <a:xfrm>
-            <a:off x="11963411" y="4138055"/>
-            <a:ext cx="1328655" cy="1323367"/>
-          </a:xfrm>
-          <a:prstGeom prst="rect">
-            <a:avLst/>
-          </a:prstGeom>
-        </p:spPr>
-      </p:pic>
-      <p:pic>
-        <p:nvPicPr>
-          <p:cNvPr id="59" name="Picture 58"/>
+          <p:cNvPr id="60" name="Picture 59"/>
           <p:cNvPicPr>
             <a:picLocks noChangeAspect="1"/>
           </p:cNvPicPr>
@@ -8423,37 +8119,7 @@
         </p:blipFill>
         <p:spPr>
           <a:xfrm>
-            <a:off x="11866173" y="6962611"/>
-            <a:ext cx="1902384" cy="1188990"/>
-          </a:xfrm>
-          <a:prstGeom prst="rect">
-            <a:avLst/>
-          </a:prstGeom>
-        </p:spPr>
-      </p:pic>
-      <p:pic>
-        <p:nvPicPr>
-          <p:cNvPr id="60" name="Picture 59"/>
-          <p:cNvPicPr>
-            <a:picLocks noChangeAspect="1"/>
-          </p:cNvPicPr>
-          <p:nvPr/>
-        </p:nvPicPr>
-        <p:blipFill>
-          <a:blip r:embed="rId6">
-            <a:extLst>
-              <a:ext uri="{28A0092B-C50C-407E-A947-70E740481C1C}">
-                <a14:useLocalDpi xmlns:a14="http://schemas.microsoft.com/office/drawing/2010/main" val="0"/>
-              </a:ext>
-            </a:extLst>
-          </a:blip>
-          <a:stretch>
-            <a:fillRect/>
-          </a:stretch>
-        </p:blipFill>
-        <p:spPr>
-          <a:xfrm>
-            <a:off x="11814893" y="8204846"/>
+            <a:off x="11727570" y="8106947"/>
             <a:ext cx="1800336" cy="1287657"/>
           </a:xfrm>
           <a:prstGeom prst="rect">
@@ -8469,8 +8135,8 @@
         </p:nvSpPr>
         <p:spPr>
           <a:xfrm>
-            <a:off x="273762" y="9936056"/>
-            <a:ext cx="6199029" cy="678054"/>
+            <a:off x="-200696" y="9874973"/>
+            <a:ext cx="6822465" cy="678054"/>
           </a:xfrm>
           <a:prstGeom prst="rect">
             <a:avLst/>
@@ -8548,10 +8214,10 @@
                 <a:cs typeface="Source Sans Pro" charset="0"/>
                 <a:sym typeface="Source Sans Pro Light"/>
               </a:rPr>
-              <a:t>mullers@tcd.ie</a:t>
-            </a:r>
-            <a:r>
-              <a:rPr lang="en-US" sz="1400" dirty="0">
+              <a:t>smueller@quanteda.org</a:t>
+            </a:r>
+            <a:r>
+              <a:rPr lang="en-US" sz="1400" i="1" dirty="0">
                 <a:latin typeface="Source Sans Pro" charset="0"/>
                 <a:ea typeface="Source Sans Pro" charset="0"/>
                 <a:cs typeface="Source Sans Pro" charset="0"/>
@@ -8566,14 +8232,17 @@
                 <a:cs typeface="Source Sans Pro" charset="0"/>
                 <a:sym typeface="Source Sans Pro Light"/>
               </a:rPr>
-              <a:t>kbenoit@lse.ac.uk</a:t>
-            </a:r>
-            <a:endParaRPr lang="en-US" sz="1400" i="1" dirty="0">
-              <a:latin typeface="Source Sans Pro" charset="0"/>
-              <a:ea typeface="Source Sans Pro" charset="0"/>
-              <a:cs typeface="Source Sans Pro" charset="0"/>
-              <a:sym typeface="Source Sans Pro Light"/>
-            </a:endParaRPr>
+              <a:t>kbenoit@quanteda.org</a:t>
+            </a:r>
+            <a:r>
+              <a:rPr lang="en-US" sz="1400" i="1" dirty="0">
+                <a:latin typeface="Source Sans Pro" charset="0"/>
+                <a:ea typeface="Source Sans Pro" charset="0"/>
+                <a:cs typeface="Source Sans Pro" charset="0"/>
+                <a:sym typeface="Source Sans Pro Light"/>
+              </a:rPr>
+              <a:t> </a:t>
+            </a:r>
           </a:p>
           <a:p>
             <a:pPr lvl="0" algn="r">
@@ -8681,16 +8350,7 @@
                 <a:cs typeface="Source Sans Pro" charset="0"/>
                 <a:sym typeface="Source Sans Pro Light"/>
               </a:rPr>
-              <a:t>•  updated</a:t>
-            </a:r>
-            <a:r>
-              <a:rPr lang="en-US" sz="1400">
-                <a:latin typeface="Source Sans Pro" charset="0"/>
-                <a:ea typeface="Source Sans Pro" charset="0"/>
-                <a:cs typeface="Source Sans Pro" charset="0"/>
-                <a:sym typeface="Source Sans Pro Light"/>
-              </a:rPr>
-              <a:t>: 11/18</a:t>
+              <a:t>•  updated: 05/2020</a:t>
             </a:r>
             <a:endParaRPr lang="en-US" sz="1400" dirty="0">
               <a:solidFill>
@@ -9494,7 +9154,7 @@
         </p:nvSpPr>
         <p:spPr>
           <a:xfrm>
-            <a:off x="129877" y="204065"/>
+            <a:off x="133549" y="204065"/>
             <a:ext cx="6436800" cy="482886"/>
           </a:xfrm>
           <a:prstGeom prst="roundRect">
@@ -9777,7 +9437,7 @@
                 <a:ea typeface="Monaco" charset="0"/>
                 <a:cs typeface="Monaco" charset="0"/>
               </a:rPr>
-              <a:t>))</a:t>
+              <a:t>"))</a:t>
             </a:r>
             <a:endParaRPr lang="en-GB" sz="1300" dirty="0">
               <a:latin typeface="Monaco" charset="0"/>

</xml_diff>

<commit_message>
Change font in dfm_weight()
</commit_message>
<xml_diff>
--- a/tests/cheatsheet/quanteda-cheatsheet.pptx
+++ b/tests/cheatsheet/quanteda-cheatsheet.pptx
@@ -1579,7 +1579,7 @@
           </a:ln>
           <a:extLst>
             <a:ext uri="{C572A759-6A51-4108-AA02-DFA0A04FC94B}">
-              <ma14:wrappingTextBoxFlag xmlns:ma14="http://schemas.microsoft.com/office/mac/drawingml/2011/main" xmlns="" val="1"/>
+              <ma14:wrappingTextBoxFlag xmlns="" xmlns:ma14="http://schemas.microsoft.com/office/mac/drawingml/2011/main" val="1"/>
             </a:ext>
           </a:extLst>
         </p:spPr>
@@ -1622,7 +1622,7 @@
           </a:ln>
           <a:extLst>
             <a:ext uri="{C572A759-6A51-4108-AA02-DFA0A04FC94B}">
-              <ma14:wrappingTextBoxFlag xmlns:ma14="http://schemas.microsoft.com/office/mac/drawingml/2011/main" xmlns="" val="1"/>
+              <ma14:wrappingTextBoxFlag xmlns="" xmlns:ma14="http://schemas.microsoft.com/office/mac/drawingml/2011/main" val="1"/>
             </a:ext>
           </a:extLst>
         </p:spPr>
@@ -2319,7 +2319,7 @@
           </a:ln>
           <a:extLst>
             <a:ext uri="{C572A759-6A51-4108-AA02-DFA0A04FC94B}">
-              <ma14:wrappingTextBoxFlag xmlns:ma14="http://schemas.microsoft.com/office/mac/drawingml/2011/main" xmlns="" val="1"/>
+              <ma14:wrappingTextBoxFlag xmlns="" xmlns:ma14="http://schemas.microsoft.com/office/mac/drawingml/2011/main" val="1"/>
             </a:ext>
           </a:extLst>
         </p:spPr>
@@ -2698,7 +2698,7 @@
           </a:ln>
           <a:extLst>
             <a:ext uri="{C572A759-6A51-4108-AA02-DFA0A04FC94B}">
-              <ma14:wrappingTextBoxFlag xmlns:ma14="http://schemas.microsoft.com/office/mac/drawingml/2011/main" xmlns="" val="1"/>
+              <ma14:wrappingTextBoxFlag xmlns="" xmlns:ma14="http://schemas.microsoft.com/office/mac/drawingml/2011/main" val="1"/>
             </a:ext>
           </a:extLst>
         </p:spPr>
@@ -2746,7 +2746,7 @@
           </a:ln>
           <a:extLst>
             <a:ext uri="{C572A759-6A51-4108-AA02-DFA0A04FC94B}">
-              <ma14:wrappingTextBoxFlag xmlns:ma14="http://schemas.microsoft.com/office/mac/drawingml/2011/main" xmlns="" val="1"/>
+              <ma14:wrappingTextBoxFlag xmlns="" xmlns:ma14="http://schemas.microsoft.com/office/mac/drawingml/2011/main" val="1"/>
             </a:ext>
           </a:extLst>
         </p:spPr>
@@ -3471,7 +3471,7 @@
           </a:ln>
           <a:extLst>
             <a:ext uri="{C572A759-6A51-4108-AA02-DFA0A04FC94B}">
-              <ma14:wrappingTextBoxFlag xmlns:ma14="http://schemas.microsoft.com/office/mac/drawingml/2011/main" xmlns="" val="1"/>
+              <ma14:wrappingTextBoxFlag xmlns="" xmlns:ma14="http://schemas.microsoft.com/office/mac/drawingml/2011/main" val="1"/>
             </a:ext>
           </a:extLst>
         </p:spPr>
@@ -3549,7 +3549,7 @@
           </a:ln>
           <a:extLst>
             <a:ext uri="{C572A759-6A51-4108-AA02-DFA0A04FC94B}">
-              <ma14:wrappingTextBoxFlag xmlns:ma14="http://schemas.microsoft.com/office/mac/drawingml/2011/main" xmlns="" val="1"/>
+              <ma14:wrappingTextBoxFlag xmlns="" xmlns:ma14="http://schemas.microsoft.com/office/mac/drawingml/2011/main" val="1"/>
             </a:ext>
           </a:extLst>
         </p:spPr>
@@ -4062,19 +4062,37 @@
                 <a:ea typeface="Monaco" charset="0"/>
                 <a:cs typeface="Monaco" charset="0"/>
               </a:rPr>
-              <a:t>(x, </a:t>
-            </a:r>
-            <a:r>
-              <a:rPr lang="en-IE" sz="1400" dirty="0"/>
+              <a:t>(x</a:t>
+            </a:r>
+            <a:r>
+              <a:rPr lang="en-GB" sz="1300" dirty="0">
+                <a:latin typeface="Monaco" pitchFamily="2" charset="77"/>
+                <a:ea typeface="Monaco" charset="0"/>
+                <a:cs typeface="Monaco" charset="0"/>
+              </a:rPr>
+              <a:t>, </a:t>
+            </a:r>
+            <a:r>
+              <a:rPr lang="en-IE" sz="1400" dirty="0">
+                <a:latin typeface="Monaco" pitchFamily="2" charset="77"/>
+              </a:rPr>
               <a:t>scheme</a:t>
             </a:r>
             <a:r>
               <a:rPr lang="en-GB" sz="1300" dirty="0">
-                <a:latin typeface="Monaco" charset="0"/>
-                <a:ea typeface="Monaco" charset="0"/>
-                <a:cs typeface="Monaco" charset="0"/>
-              </a:rPr>
-              <a:t> = "prop") | </a:t>
+                <a:latin typeface="Monaco" pitchFamily="2" charset="77"/>
+                <a:ea typeface="Monaco" charset="0"/>
+                <a:cs typeface="Monaco" charset="0"/>
+              </a:rPr>
+              <a:t> = "prop") </a:t>
+            </a:r>
+            <a:r>
+              <a:rPr lang="en-GB" sz="1300" dirty="0">
+                <a:latin typeface="Monaco" charset="0"/>
+                <a:ea typeface="Monaco" charset="0"/>
+                <a:cs typeface="Monaco" charset="0"/>
+              </a:rPr>
+              <a:t>| </a:t>
             </a:r>
             <a:r>
               <a:rPr lang="en-GB" sz="1300" dirty="0" err="1">
@@ -4525,7 +4543,7 @@
           </a:ln>
           <a:extLst>
             <a:ext uri="{C572A759-6A51-4108-AA02-DFA0A04FC94B}">
-              <ma14:wrappingTextBoxFlag xmlns:ma14="http://schemas.microsoft.com/office/mac/drawingml/2011/main" xmlns="" val="1"/>
+              <ma14:wrappingTextBoxFlag xmlns="" xmlns:ma14="http://schemas.microsoft.com/office/mac/drawingml/2011/main" val="1"/>
             </a:ext>
           </a:extLst>
         </p:spPr>
@@ -4739,7 +4757,7 @@
           </a:ln>
           <a:extLst>
             <a:ext uri="{C572A759-6A51-4108-AA02-DFA0A04FC94B}">
-              <ma14:wrappingTextBoxFlag xmlns:ma14="http://schemas.microsoft.com/office/mac/drawingml/2011/main" xmlns="" val="1"/>
+              <ma14:wrappingTextBoxFlag xmlns="" xmlns:ma14="http://schemas.microsoft.com/office/mac/drawingml/2011/main" val="1"/>
             </a:ext>
           </a:extLst>
         </p:spPr>
@@ -4789,7 +4807,7 @@
           </a:ln>
           <a:extLst>
             <a:ext uri="{C572A759-6A51-4108-AA02-DFA0A04FC94B}">
-              <ma14:wrappingTextBoxFlag xmlns:ma14="http://schemas.microsoft.com/office/mac/drawingml/2011/main" xmlns="" val="1"/>
+              <ma14:wrappingTextBoxFlag xmlns="" xmlns:ma14="http://schemas.microsoft.com/office/mac/drawingml/2011/main" val="1"/>
             </a:ext>
           </a:extLst>
         </p:spPr>
@@ -4834,7 +4852,7 @@
           </a:ln>
           <a:extLst>
             <a:ext uri="{C572A759-6A51-4108-AA02-DFA0A04FC94B}">
-              <ma14:wrappingTextBoxFlag xmlns:ma14="http://schemas.microsoft.com/office/mac/drawingml/2011/main" xmlns="" val="1"/>
+              <ma14:wrappingTextBoxFlag xmlns="" xmlns:ma14="http://schemas.microsoft.com/office/mac/drawingml/2011/main" val="1"/>
             </a:ext>
           </a:extLst>
         </p:spPr>
@@ -4947,7 +4965,7 @@
           </a:ln>
           <a:extLst>
             <a:ext uri="{C572A759-6A51-4108-AA02-DFA0A04FC94B}">
-              <ma14:wrappingTextBoxFlag xmlns:ma14="http://schemas.microsoft.com/office/mac/drawingml/2011/main" xmlns="" val="1"/>
+              <ma14:wrappingTextBoxFlag xmlns="" xmlns:ma14="http://schemas.microsoft.com/office/mac/drawingml/2011/main" val="1"/>
             </a:ext>
           </a:extLst>
         </p:spPr>
@@ -5052,7 +5070,7 @@
           </a:ln>
           <a:extLst>
             <a:ext uri="{C572A759-6A51-4108-AA02-DFA0A04FC94B}">
-              <ma14:wrappingTextBoxFlag xmlns:ma14="http://schemas.microsoft.com/office/mac/drawingml/2011/main" xmlns="" val="1"/>
+              <ma14:wrappingTextBoxFlag xmlns="" xmlns:ma14="http://schemas.microsoft.com/office/mac/drawingml/2011/main" val="1"/>
             </a:ext>
           </a:extLst>
         </p:spPr>
@@ -5851,7 +5869,7 @@
           </a:ln>
           <a:extLst>
             <a:ext uri="{C572A759-6A51-4108-AA02-DFA0A04FC94B}">
-              <ma14:wrappingTextBoxFlag xmlns:ma14="http://schemas.microsoft.com/office/mac/drawingml/2011/main" xmlns="" val="1"/>
+              <ma14:wrappingTextBoxFlag xmlns="" xmlns:ma14="http://schemas.microsoft.com/office/mac/drawingml/2011/main" val="1"/>
             </a:ext>
           </a:extLst>
         </p:spPr>
@@ -6452,7 +6470,7 @@
           </a:ln>
           <a:extLst>
             <a:ext uri="{C572A759-6A51-4108-AA02-DFA0A04FC94B}">
-              <ma14:wrappingTextBoxFlag xmlns:ma14="http://schemas.microsoft.com/office/mac/drawingml/2011/main" xmlns="" val="1"/>
+              <ma14:wrappingTextBoxFlag xmlns="" xmlns:ma14="http://schemas.microsoft.com/office/mac/drawingml/2011/main" val="1"/>
             </a:ext>
           </a:extLst>
         </p:spPr>
@@ -7051,7 +7069,7 @@
           </a:ln>
           <a:extLst>
             <a:ext uri="{C572A759-6A51-4108-AA02-DFA0A04FC94B}">
-              <ma14:wrappingTextBoxFlag xmlns:ma14="http://schemas.microsoft.com/office/mac/drawingml/2011/main" xmlns="" val="1"/>
+              <ma14:wrappingTextBoxFlag xmlns="" xmlns:ma14="http://schemas.microsoft.com/office/mac/drawingml/2011/main" val="1"/>
             </a:ext>
           </a:extLst>
         </p:spPr>
@@ -7640,7 +7658,7 @@
           </a:ln>
           <a:extLst>
             <a:ext uri="{C572A759-6A51-4108-AA02-DFA0A04FC94B}">
-              <ma14:wrappingTextBoxFlag xmlns:ma14="http://schemas.microsoft.com/office/mac/drawingml/2011/main" xmlns="" val="1"/>
+              <ma14:wrappingTextBoxFlag xmlns="" xmlns:ma14="http://schemas.microsoft.com/office/mac/drawingml/2011/main" val="1"/>
             </a:ext>
           </a:extLst>
         </p:spPr>
@@ -7686,7 +7704,7 @@
           </a:ln>
           <a:extLst>
             <a:ext uri="{C572A759-6A51-4108-AA02-DFA0A04FC94B}">
-              <ma14:wrappingTextBoxFlag xmlns:ma14="http://schemas.microsoft.com/office/mac/drawingml/2011/main" xmlns="" val="1"/>
+              <ma14:wrappingTextBoxFlag xmlns="" xmlns:ma14="http://schemas.microsoft.com/office/mac/drawingml/2011/main" val="1"/>
             </a:ext>
           </a:extLst>
         </p:spPr>
@@ -7772,7 +7790,7 @@
           </a:ln>
           <a:extLst>
             <a:ext uri="{C572A759-6A51-4108-AA02-DFA0A04FC94B}">
-              <ma14:wrappingTextBoxFlag xmlns:ma14="http://schemas.microsoft.com/office/mac/drawingml/2011/main" xmlns="" val="1"/>
+              <ma14:wrappingTextBoxFlag xmlns="" xmlns:ma14="http://schemas.microsoft.com/office/mac/drawingml/2011/main" val="1"/>
             </a:ext>
           </a:extLst>
         </p:spPr>
@@ -7930,7 +7948,7 @@
           </a:ln>
           <a:extLst>
             <a:ext uri="{C572A759-6A51-4108-AA02-DFA0A04FC94B}">
-              <ma14:wrappingTextBoxFlag xmlns:ma14="http://schemas.microsoft.com/office/mac/drawingml/2011/main" xmlns="" val="1"/>
+              <ma14:wrappingTextBoxFlag xmlns="" xmlns:ma14="http://schemas.microsoft.com/office/mac/drawingml/2011/main" val="1"/>
             </a:ext>
           </a:extLst>
         </p:spPr>
@@ -7976,7 +7994,7 @@
           </a:ln>
           <a:extLst>
             <a:ext uri="{C572A759-6A51-4108-AA02-DFA0A04FC94B}">
-              <ma14:wrappingTextBoxFlag xmlns:ma14="http://schemas.microsoft.com/office/mac/drawingml/2011/main" xmlns="" val="1"/>
+              <ma14:wrappingTextBoxFlag xmlns="" xmlns:ma14="http://schemas.microsoft.com/office/mac/drawingml/2011/main" val="1"/>
             </a:ext>
           </a:extLst>
         </p:spPr>
@@ -8146,7 +8164,7 @@
           </a:ln>
           <a:extLst>
             <a:ext uri="{C572A759-6A51-4108-AA02-DFA0A04FC94B}">
-              <ma14:wrappingTextBoxFlag xmlns:ma14="http://schemas.microsoft.com/office/mac/drawingml/2011/main" xmlns="" val="1"/>
+              <ma14:wrappingTextBoxFlag xmlns="" xmlns:ma14="http://schemas.microsoft.com/office/mac/drawingml/2011/main" val="1"/>
             </a:ext>
           </a:extLst>
         </p:spPr>
@@ -8384,7 +8402,7 @@
           </a:ln>
           <a:extLst>
             <a:ext uri="{C572A759-6A51-4108-AA02-DFA0A04FC94B}">
-              <ma14:wrappingTextBoxFlag xmlns:ma14="http://schemas.microsoft.com/office/mac/drawingml/2011/main" xmlns="" val="1"/>
+              <ma14:wrappingTextBoxFlag xmlns="" xmlns:ma14="http://schemas.microsoft.com/office/mac/drawingml/2011/main" val="1"/>
             </a:ext>
           </a:extLst>
         </p:spPr>
@@ -9124,7 +9142,7 @@
           </a:ln>
           <a:extLst>
             <a:ext uri="{C572A759-6A51-4108-AA02-DFA0A04FC94B}">
-              <ma14:wrappingTextBoxFlag xmlns:ma14="http://schemas.microsoft.com/office/mac/drawingml/2011/main" xmlns="" val="1"/>
+              <ma14:wrappingTextBoxFlag xmlns="" xmlns:ma14="http://schemas.microsoft.com/office/mac/drawingml/2011/main" val="1"/>
             </a:ext>
           </a:extLst>
         </p:spPr>
@@ -9170,7 +9188,7 @@
           </a:ln>
           <a:extLst>
             <a:ext uri="{C572A759-6A51-4108-AA02-DFA0A04FC94B}">
-              <ma14:wrappingTextBoxFlag xmlns:ma14="http://schemas.microsoft.com/office/mac/drawingml/2011/main" xmlns="" val="1"/>
+              <ma14:wrappingTextBoxFlag xmlns="" xmlns:ma14="http://schemas.microsoft.com/office/mac/drawingml/2011/main" val="1"/>
             </a:ext>
           </a:extLst>
         </p:spPr>
@@ -9309,7 +9327,7 @@
           </a:ln>
           <a:extLst>
             <a:ext uri="{C572A759-6A51-4108-AA02-DFA0A04FC94B}">
-              <ma14:wrappingTextBoxFlag xmlns:ma14="http://schemas.microsoft.com/office/mac/drawingml/2011/main" xmlns="" val="1"/>
+              <ma14:wrappingTextBoxFlag xmlns="" xmlns:ma14="http://schemas.microsoft.com/office/mac/drawingml/2011/main" val="1"/>
             </a:ext>
           </a:extLst>
         </p:spPr>
@@ -9471,7 +9489,7 @@
           </a:ln>
           <a:extLst>
             <a:ext uri="{C572A759-6A51-4108-AA02-DFA0A04FC94B}">
-              <ma14:wrappingTextBoxFlag xmlns:ma14="http://schemas.microsoft.com/office/mac/drawingml/2011/main" xmlns="" val="1"/>
+              <ma14:wrappingTextBoxFlag xmlns="" xmlns:ma14="http://schemas.microsoft.com/office/mac/drawingml/2011/main" val="1"/>
             </a:ext>
           </a:extLst>
         </p:spPr>

</xml_diff>

<commit_message>
Minor tweaks to cheatsheet
</commit_message>
<xml_diff>
--- a/tests/cheatsheet/quanteda-cheatsheet.pptx
+++ b/tests/cheatsheet/quanteda-cheatsheet.pptx
@@ -1579,7 +1579,7 @@
           </a:ln>
           <a:extLst>
             <a:ext uri="{C572A759-6A51-4108-AA02-DFA0A04FC94B}">
-              <ma14:wrappingTextBoxFlag xmlns="" xmlns:ma14="http://schemas.microsoft.com/office/mac/drawingml/2011/main" val="1"/>
+              <ma14:wrappingTextBoxFlag xmlns:ma14="http://schemas.microsoft.com/office/mac/drawingml/2011/main" xmlns="" val="1"/>
             </a:ext>
           </a:extLst>
         </p:spPr>
@@ -1622,7 +1622,7 @@
           </a:ln>
           <a:extLst>
             <a:ext uri="{C572A759-6A51-4108-AA02-DFA0A04FC94B}">
-              <ma14:wrappingTextBoxFlag xmlns="" xmlns:ma14="http://schemas.microsoft.com/office/mac/drawingml/2011/main" val="1"/>
+              <ma14:wrappingTextBoxFlag xmlns:ma14="http://schemas.microsoft.com/office/mac/drawingml/2011/main" xmlns="" val="1"/>
             </a:ext>
           </a:extLst>
         </p:spPr>
@@ -2249,7 +2249,7 @@
           </a:ln>
           <a:extLst>
             <a:ext uri="{C572A759-6A51-4108-AA02-DFA0A04FC94B}">
-              <ma14:wrappingTextBoxFlag xmlns="" xmlns:ma14="http://schemas.microsoft.com/office/mac/drawingml/2011/main" val="1"/>
+              <ma14:wrappingTextBoxFlag xmlns:ma14="http://schemas.microsoft.com/office/mac/drawingml/2011/main" xmlns="" val="1"/>
             </a:ext>
           </a:extLst>
         </p:spPr>
@@ -2506,13 +2506,22 @@
               <a:buChar char="•"/>
             </a:pPr>
             <a:r>
+              <a:rPr lang="en-US" sz="1400" b="1" i="1" dirty="0">
+                <a:latin typeface="Source Sans Pro" charset="0"/>
+                <a:ea typeface="Source Sans Pro" charset="0"/>
+                <a:cs typeface="Source Sans Pro" charset="0"/>
+                <a:sym typeface="Source Sans Pro Light"/>
+              </a:rPr>
+              <a:t>object</a:t>
+            </a:r>
+            <a:r>
               <a:rPr lang="en-US" sz="1400" b="1" dirty="0">
                 <a:latin typeface="Source Sans Pro" charset="0"/>
                 <a:ea typeface="Source Sans Pro" charset="0"/>
                 <a:cs typeface="Source Sans Pro" charset="0"/>
                 <a:sym typeface="Source Sans Pro Light"/>
               </a:rPr>
-              <a:t>object() </a:t>
+              <a:t>() </a:t>
             </a:r>
             <a:r>
               <a:rPr lang="en-US" sz="1400" dirty="0">
@@ -2530,13 +2539,31 @@
               <a:buChar char="•"/>
             </a:pPr>
             <a:r>
+              <a:rPr lang="en-US" sz="1400" b="1" i="1" dirty="0" err="1">
+                <a:latin typeface="Source Sans Pro" charset="0"/>
+                <a:ea typeface="Source Sans Pro" charset="0"/>
+                <a:cs typeface="Source Sans Pro" charset="0"/>
+                <a:sym typeface="Source Sans Pro Light"/>
+              </a:rPr>
+              <a:t>object</a:t>
+            </a:r>
+            <a:r>
               <a:rPr lang="en-US" sz="1400" b="1" dirty="0" err="1">
                 <a:latin typeface="Source Sans Pro" charset="0"/>
                 <a:ea typeface="Source Sans Pro" charset="0"/>
                 <a:cs typeface="Source Sans Pro" charset="0"/>
                 <a:sym typeface="Source Sans Pro Light"/>
               </a:rPr>
-              <a:t>object_verb</a:t>
+              <a:t>_</a:t>
+            </a:r>
+            <a:r>
+              <a:rPr lang="en-US" sz="1400" b="1" i="1" dirty="0" err="1">
+                <a:latin typeface="Source Sans Pro" charset="0"/>
+                <a:ea typeface="Source Sans Pro" charset="0"/>
+                <a:cs typeface="Source Sans Pro" charset="0"/>
+                <a:sym typeface="Source Sans Pro Light"/>
+              </a:rPr>
+              <a:t>verb</a:t>
             </a:r>
             <a:r>
               <a:rPr lang="en-US" sz="1400" b="1" dirty="0">
@@ -2628,7 +2655,7 @@
           </a:ln>
           <a:extLst>
             <a:ext uri="{C572A759-6A51-4108-AA02-DFA0A04FC94B}">
-              <ma14:wrappingTextBoxFlag xmlns="" xmlns:ma14="http://schemas.microsoft.com/office/mac/drawingml/2011/main" val="1"/>
+              <ma14:wrappingTextBoxFlag xmlns:ma14="http://schemas.microsoft.com/office/mac/drawingml/2011/main" xmlns="" val="1"/>
             </a:ext>
           </a:extLst>
         </p:spPr>
@@ -2711,7 +2738,7 @@
           </a:ln>
           <a:extLst>
             <a:ext uri="{C572A759-6A51-4108-AA02-DFA0A04FC94B}">
-              <ma14:wrappingTextBoxFlag xmlns="" xmlns:ma14="http://schemas.microsoft.com/office/mac/drawingml/2011/main" val="1"/>
+              <ma14:wrappingTextBoxFlag xmlns:ma14="http://schemas.microsoft.com/office/mac/drawingml/2011/main" xmlns="" val="1"/>
             </a:ext>
           </a:extLst>
         </p:spPr>
@@ -3458,7 +3485,7 @@
           </a:ln>
           <a:extLst>
             <a:ext uri="{C572A759-6A51-4108-AA02-DFA0A04FC94B}">
-              <ma14:wrappingTextBoxFlag xmlns="" xmlns:ma14="http://schemas.microsoft.com/office/mac/drawingml/2011/main" val="1"/>
+              <ma14:wrappingTextBoxFlag xmlns:ma14="http://schemas.microsoft.com/office/mac/drawingml/2011/main" xmlns="" val="1"/>
             </a:ext>
           </a:extLst>
         </p:spPr>
@@ -3526,7 +3553,7 @@
         <p:spPr>
           <a:xfrm>
             <a:off x="7191914" y="6170222"/>
-            <a:ext cx="6743492" cy="4980851"/>
+            <a:ext cx="6743492" cy="4780796"/>
           </a:xfrm>
           <a:prstGeom prst="rect">
             <a:avLst/>
@@ -3536,7 +3563,7 @@
           </a:ln>
           <a:extLst>
             <a:ext uri="{C572A759-6A51-4108-AA02-DFA0A04FC94B}">
-              <ma14:wrappingTextBoxFlag xmlns="" xmlns:ma14="http://schemas.microsoft.com/office/mac/drawingml/2011/main" val="1"/>
+              <ma14:wrappingTextBoxFlag xmlns:ma14="http://schemas.microsoft.com/office/mac/drawingml/2011/main" xmlns="" val="1"/>
             </a:ext>
           </a:extLst>
         </p:spPr>
@@ -3683,7 +3710,7 @@
                 <a:ea typeface="Monaco" charset="0"/>
                 <a:cs typeface="Monaco" charset="0"/>
               </a:rPr>
-              <a:t>, pattern = data_dictionary_LSD2015, selection = "keep")</a:t>
+              <a:t>, pattern = "recommend*"), selection = "keep")</a:t>
             </a:r>
           </a:p>
           <a:p>
@@ -4259,7 +4286,7 @@
               <a:t>/</a:t>
             </a:r>
             <a:r>
-              <a:rPr lang="en-US" sz="1300" dirty="0" err="1">
+              <a:rPr lang="en-US" sz="1300">
                 <a:solidFill>
                   <a:srgbClr val="006AC7"/>
                 </a:solidFill>
@@ -4270,7 +4297,18 @@
               <a:t>tolower</a:t>
             </a:r>
             <a:r>
-              <a:rPr lang="en-US" sz="1300" dirty="0">
+              <a:rPr lang="en-US" sz="1200">
+                <a:solidFill>
+                  <a:schemeClr val="tx1"/>
+                </a:solidFill>
+                <a:latin typeface="Monaco" charset="0"/>
+                <a:ea typeface="Monaco" charset="0"/>
+                <a:cs typeface="Monaco" charset="0"/>
+              </a:rPr>
+              <a:t>()</a:t>
+            </a:r>
+            <a:r>
+              <a:rPr lang="en-US" sz="1300">
                 <a:solidFill>
                   <a:srgbClr val="006AC7"/>
                 </a:solidFill>
@@ -4331,7 +4369,7 @@
         <p:spPr>
           <a:xfrm>
             <a:off x="3931008" y="1498019"/>
-            <a:ext cx="3053316" cy="1938992"/>
+            <a:ext cx="3053316" cy="2369880"/>
           </a:xfrm>
           <a:prstGeom prst="rect">
             <a:avLst/>
@@ -4341,7 +4379,7 @@
           </a:ln>
           <a:extLst>
             <a:ext uri="{C572A759-6A51-4108-AA02-DFA0A04FC94B}">
-              <ma14:wrappingTextBoxFlag xmlns="" xmlns:ma14="http://schemas.microsoft.com/office/mac/drawingml/2011/main" val="1"/>
+              <ma14:wrappingTextBoxFlag xmlns:ma14="http://schemas.microsoft.com/office/mac/drawingml/2011/main" xmlns="" val="1"/>
             </a:ext>
           </a:extLst>
         </p:spPr>
@@ -4496,11 +4534,84 @@
               </a:rPr>
               <a:t> lists in R</a:t>
             </a:r>
-            <a:endParaRPr lang="en-US" sz="1400" b="1" dirty="0">
-              <a:latin typeface="Source Sans Pro" charset="0"/>
-              <a:ea typeface="Source Sans Pro" charset="0"/>
-              <a:cs typeface="Source Sans Pro" charset="0"/>
-            </a:endParaRPr>
+          </a:p>
+          <a:p>
+            <a:pPr marL="171450" indent="-171450" algn="l">
+              <a:buFont typeface="Arial" charset="0"/>
+              <a:buChar char="•"/>
+            </a:pPr>
+            <a:r>
+              <a:rPr lang="en-US" sz="1400" b="1" dirty="0" err="1">
+                <a:latin typeface="Source Sans Pro" charset="0"/>
+                <a:ea typeface="Source Sans Pro" charset="0"/>
+                <a:cs typeface="Source Sans Pro" charset="0"/>
+              </a:rPr>
+              <a:t>quanteda</a:t>
+            </a:r>
+            <a:r>
+              <a:rPr lang="en-US" sz="1400" b="1" dirty="0">
+                <a:latin typeface="Source Sans Pro" charset="0"/>
+                <a:ea typeface="Source Sans Pro" charset="0"/>
+                <a:cs typeface="Source Sans Pro" charset="0"/>
+              </a:rPr>
+              <a:t>.[</a:t>
+            </a:r>
+            <a:r>
+              <a:rPr lang="en-US" sz="1400" b="1" dirty="0" err="1">
+                <a:latin typeface="Source Sans Pro" charset="0"/>
+                <a:ea typeface="Source Sans Pro" charset="0"/>
+                <a:cs typeface="Source Sans Pro" charset="0"/>
+              </a:rPr>
+              <a:t>textstats</a:t>
+            </a:r>
+            <a:r>
+              <a:rPr lang="en-US" sz="1400" b="1" dirty="0">
+                <a:latin typeface="Source Sans Pro" charset="0"/>
+                <a:ea typeface="Source Sans Pro" charset="0"/>
+                <a:cs typeface="Source Sans Pro" charset="0"/>
+              </a:rPr>
+              <a:t>/</a:t>
+            </a:r>
+            <a:r>
+              <a:rPr lang="en-US" sz="1400" b="1" dirty="0" err="1">
+                <a:latin typeface="Source Sans Pro" charset="0"/>
+                <a:ea typeface="Source Sans Pro" charset="0"/>
+                <a:cs typeface="Source Sans Pro" charset="0"/>
+              </a:rPr>
+              <a:t>textmodels</a:t>
+            </a:r>
+            <a:r>
+              <a:rPr lang="en-US" sz="1400" b="1" dirty="0">
+                <a:latin typeface="Source Sans Pro" charset="0"/>
+                <a:ea typeface="Source Sans Pro" charset="0"/>
+                <a:cs typeface="Source Sans Pro" charset="0"/>
+              </a:rPr>
+              <a:t>/ </a:t>
+            </a:r>
+            <a:r>
+              <a:rPr lang="en-US" sz="1400" b="1" dirty="0" err="1">
+                <a:latin typeface="Source Sans Pro" charset="0"/>
+                <a:ea typeface="Source Sans Pro" charset="0"/>
+                <a:cs typeface="Source Sans Pro" charset="0"/>
+              </a:rPr>
+              <a:t>textplots</a:t>
+            </a:r>
+            <a:r>
+              <a:rPr lang="en-US" sz="1400" b="1" dirty="0">
+                <a:latin typeface="Source Sans Pro" charset="0"/>
+                <a:ea typeface="Source Sans Pro" charset="0"/>
+                <a:cs typeface="Source Sans Pro" charset="0"/>
+              </a:rPr>
+              <a:t>] </a:t>
+            </a:r>
+            <a:r>
+              <a:rPr lang="en-US" sz="1400" dirty="0">
+                <a:latin typeface="Source Sans Pro" charset="0"/>
+                <a:ea typeface="Source Sans Pro" charset="0"/>
+                <a:cs typeface="Source Sans Pro" charset="0"/>
+              </a:rPr>
+              <a:t>text analysis packages</a:t>
+            </a:r>
           </a:p>
         </p:txBody>
       </p:sp>
@@ -4528,7 +4639,7 @@
           </a:ln>
           <a:extLst>
             <a:ext uri="{C572A759-6A51-4108-AA02-DFA0A04FC94B}">
-              <ma14:wrappingTextBoxFlag xmlns="" xmlns:ma14="http://schemas.microsoft.com/office/mac/drawingml/2011/main" val="1"/>
+              <ma14:wrappingTextBoxFlag xmlns:ma14="http://schemas.microsoft.com/office/mac/drawingml/2011/main" xmlns="" val="1"/>
             </a:ext>
           </a:extLst>
         </p:spPr>
@@ -4573,7 +4684,7 @@
           </a:ln>
           <a:extLst>
             <a:ext uri="{C572A759-6A51-4108-AA02-DFA0A04FC94B}">
-              <ma14:wrappingTextBoxFlag xmlns="" xmlns:ma14="http://schemas.microsoft.com/office/mac/drawingml/2011/main" val="1"/>
+              <ma14:wrappingTextBoxFlag xmlns:ma14="http://schemas.microsoft.com/office/mac/drawingml/2011/main" xmlns="" val="1"/>
             </a:ext>
           </a:extLst>
         </p:spPr>
@@ -4686,7 +4797,7 @@
           </a:ln>
           <a:extLst>
             <a:ext uri="{C572A759-6A51-4108-AA02-DFA0A04FC94B}">
-              <ma14:wrappingTextBoxFlag xmlns="" xmlns:ma14="http://schemas.microsoft.com/office/mac/drawingml/2011/main" val="1"/>
+              <ma14:wrappingTextBoxFlag xmlns:ma14="http://schemas.microsoft.com/office/mac/drawingml/2011/main" xmlns="" val="1"/>
             </a:ext>
           </a:extLst>
         </p:spPr>
@@ -4850,7 +4961,7 @@
           </a:ln>
           <a:extLst>
             <a:ext uri="{C572A759-6A51-4108-AA02-DFA0A04FC94B}">
-              <ma14:wrappingTextBoxFlag xmlns="" xmlns:ma14="http://schemas.microsoft.com/office/mac/drawingml/2011/main" val="1"/>
+              <ma14:wrappingTextBoxFlag xmlns:ma14="http://schemas.microsoft.com/office/mac/drawingml/2011/main" xmlns="" val="1"/>
             </a:ext>
           </a:extLst>
         </p:spPr>
@@ -5909,6 +6020,17 @@
                 <a:cs typeface="Monaco" charset="0"/>
               </a:rPr>
               <a:t>tolower</a:t>
+            </a:r>
+            <a:r>
+              <a:rPr lang="en-US" sz="1400" dirty="0">
+                <a:solidFill>
+                  <a:schemeClr val="tx1"/>
+                </a:solidFill>
+                <a:latin typeface="Monaco" charset="0"/>
+                <a:ea typeface="Monaco" charset="0"/>
+                <a:cs typeface="Monaco" charset="0"/>
+              </a:rPr>
+              <a:t>()</a:t>
             </a:r>
             <a:r>
               <a:rPr lang="en-US" sz="1400" dirty="0">
@@ -5978,7 +6100,7 @@
           </a:ln>
           <a:extLst>
             <a:ext uri="{C572A759-6A51-4108-AA02-DFA0A04FC94B}">
-              <ma14:wrappingTextBoxFlag xmlns="" xmlns:ma14="http://schemas.microsoft.com/office/mac/drawingml/2011/main" val="1"/>
+              <ma14:wrappingTextBoxFlag xmlns:ma14="http://schemas.microsoft.com/office/mac/drawingml/2011/main" xmlns="" val="1"/>
             </a:ext>
           </a:extLst>
         </p:spPr>
@@ -6053,7 +6175,7 @@
           </a:ln>
           <a:extLst>
             <a:ext uri="{C572A759-6A51-4108-AA02-DFA0A04FC94B}">
-              <ma14:wrappingTextBoxFlag xmlns="" xmlns:ma14="http://schemas.microsoft.com/office/mac/drawingml/2011/main" val="1"/>
+              <ma14:wrappingTextBoxFlag xmlns:ma14="http://schemas.microsoft.com/office/mac/drawingml/2011/main" xmlns="" val="1"/>
             </a:ext>
           </a:extLst>
         </p:spPr>
@@ -6257,7 +6379,7 @@
                 <a:cs typeface="Source Sans Pro" charset="0"/>
                 <a:sym typeface="Source Sans Pro Light"/>
               </a:rPr>
-              <a:t>•  updated: 11/2022</a:t>
+              <a:t>•  updated: 12/2022</a:t>
             </a:r>
             <a:endParaRPr lang="en-US" sz="1400" dirty="0">
               <a:solidFill>
@@ -6526,7 +6648,7 @@
           </a:ln>
           <a:extLst>
             <a:ext uri="{C572A759-6A51-4108-AA02-DFA0A04FC94B}">
-              <ma14:wrappingTextBoxFlag xmlns="" xmlns:ma14="http://schemas.microsoft.com/office/mac/drawingml/2011/main" val="1"/>
+              <ma14:wrappingTextBoxFlag xmlns:ma14="http://schemas.microsoft.com/office/mac/drawingml/2011/main" xmlns="" val="1"/>
             </a:ext>
           </a:extLst>
         </p:spPr>
@@ -7127,7 +7249,7 @@
           </a:ln>
           <a:extLst>
             <a:ext uri="{C572A759-6A51-4108-AA02-DFA0A04FC94B}">
-              <ma14:wrappingTextBoxFlag xmlns="" xmlns:ma14="http://schemas.microsoft.com/office/mac/drawingml/2011/main" val="1"/>
+              <ma14:wrappingTextBoxFlag xmlns:ma14="http://schemas.microsoft.com/office/mac/drawingml/2011/main" xmlns="" val="1"/>
             </a:ext>
           </a:extLst>
         </p:spPr>
@@ -7675,7 +7797,7 @@
           </a:ln>
           <a:extLst>
             <a:ext uri="{C572A759-6A51-4108-AA02-DFA0A04FC94B}">
-              <ma14:wrappingTextBoxFlag xmlns="" xmlns:ma14="http://schemas.microsoft.com/office/mac/drawingml/2011/main" val="1"/>
+              <ma14:wrappingTextBoxFlag xmlns:ma14="http://schemas.microsoft.com/office/mac/drawingml/2011/main" xmlns="" val="1"/>
             </a:ext>
           </a:extLst>
         </p:spPr>
@@ -8238,7 +8360,7 @@
           </a:ln>
           <a:extLst>
             <a:ext uri="{C572A759-6A51-4108-AA02-DFA0A04FC94B}">
-              <ma14:wrappingTextBoxFlag xmlns="" xmlns:ma14="http://schemas.microsoft.com/office/mac/drawingml/2011/main" val="1"/>
+              <ma14:wrappingTextBoxFlag xmlns:ma14="http://schemas.microsoft.com/office/mac/drawingml/2011/main" xmlns="" val="1"/>
             </a:ext>
           </a:extLst>
         </p:spPr>
@@ -8284,7 +8406,7 @@
           </a:ln>
           <a:extLst>
             <a:ext uri="{C572A759-6A51-4108-AA02-DFA0A04FC94B}">
-              <ma14:wrappingTextBoxFlag xmlns="" xmlns:ma14="http://schemas.microsoft.com/office/mac/drawingml/2011/main" val="1"/>
+              <ma14:wrappingTextBoxFlag xmlns:ma14="http://schemas.microsoft.com/office/mac/drawingml/2011/main" xmlns="" val="1"/>
             </a:ext>
           </a:extLst>
         </p:spPr>
@@ -8442,7 +8564,7 @@
           </a:ln>
           <a:extLst>
             <a:ext uri="{C572A759-6A51-4108-AA02-DFA0A04FC94B}">
-              <ma14:wrappingTextBoxFlag xmlns="" xmlns:ma14="http://schemas.microsoft.com/office/mac/drawingml/2011/main" val="1"/>
+              <ma14:wrappingTextBoxFlag xmlns:ma14="http://schemas.microsoft.com/office/mac/drawingml/2011/main" xmlns="" val="1"/>
             </a:ext>
           </a:extLst>
         </p:spPr>
@@ -8572,7 +8694,7 @@
           </a:ln>
           <a:extLst>
             <a:ext uri="{C572A759-6A51-4108-AA02-DFA0A04FC94B}">
-              <ma14:wrappingTextBoxFlag xmlns="" xmlns:ma14="http://schemas.microsoft.com/office/mac/drawingml/2011/main" val="1"/>
+              <ma14:wrappingTextBoxFlag xmlns:ma14="http://schemas.microsoft.com/office/mac/drawingml/2011/main" xmlns="" val="1"/>
             </a:ext>
           </a:extLst>
         </p:spPr>
@@ -8878,7 +9000,7 @@
           </a:ln>
           <a:extLst>
             <a:ext uri="{C572A759-6A51-4108-AA02-DFA0A04FC94B}">
-              <ma14:wrappingTextBoxFlag xmlns="" xmlns:ma14="http://schemas.microsoft.com/office/mac/drawingml/2011/main" val="1"/>
+              <ma14:wrappingTextBoxFlag xmlns:ma14="http://schemas.microsoft.com/office/mac/drawingml/2011/main" xmlns="" val="1"/>
             </a:ext>
           </a:extLst>
         </p:spPr>
@@ -9040,7 +9162,7 @@
           </a:ln>
           <a:extLst>
             <a:ext uri="{C572A759-6A51-4108-AA02-DFA0A04FC94B}">
-              <ma14:wrappingTextBoxFlag xmlns="" xmlns:ma14="http://schemas.microsoft.com/office/mac/drawingml/2011/main" val="1"/>
+              <ma14:wrappingTextBoxFlag xmlns:ma14="http://schemas.microsoft.com/office/mac/drawingml/2011/main" xmlns="" val="1"/>
             </a:ext>
           </a:extLst>
         </p:spPr>
@@ -9144,7 +9266,7 @@
           </a:ln>
           <a:extLst>
             <a:ext uri="{C572A759-6A51-4108-AA02-DFA0A04FC94B}">
-              <ma14:wrappingTextBoxFlag xmlns="" xmlns:ma14="http://schemas.microsoft.com/office/mac/drawingml/2011/main" val="1"/>
+              <ma14:wrappingTextBoxFlag xmlns:ma14="http://schemas.microsoft.com/office/mac/drawingml/2011/main" xmlns="" val="1"/>
             </a:ext>
           </a:extLst>
         </p:spPr>
@@ -9289,7 +9411,7 @@
           </a:ln>
           <a:extLst>
             <a:ext uri="{C572A759-6A51-4108-AA02-DFA0A04FC94B}">
-              <ma14:wrappingTextBoxFlag xmlns="" xmlns:ma14="http://schemas.microsoft.com/office/mac/drawingml/2011/main" val="1"/>
+              <ma14:wrappingTextBoxFlag xmlns:ma14="http://schemas.microsoft.com/office/mac/drawingml/2011/main" xmlns="" val="1"/>
             </a:ext>
           </a:extLst>
         </p:spPr>
@@ -9505,7 +9627,7 @@
           </a:ln>
           <a:extLst>
             <a:ext uri="{C572A759-6A51-4108-AA02-DFA0A04FC94B}">
-              <ma14:wrappingTextBoxFlag xmlns="" xmlns:ma14="http://schemas.microsoft.com/office/mac/drawingml/2011/main" val="1"/>
+              <ma14:wrappingTextBoxFlag xmlns:ma14="http://schemas.microsoft.com/office/mac/drawingml/2011/main" xmlns="" val="1"/>
             </a:ext>
           </a:extLst>
         </p:spPr>
@@ -10296,7 +10418,7 @@
           </a:ln>
           <a:extLst>
             <a:ext uri="{C572A759-6A51-4108-AA02-DFA0A04FC94B}">
-              <ma14:wrappingTextBoxFlag xmlns="" xmlns:ma14="http://schemas.microsoft.com/office/mac/drawingml/2011/main" val="1"/>
+              <ma14:wrappingTextBoxFlag xmlns:ma14="http://schemas.microsoft.com/office/mac/drawingml/2011/main" xmlns="" val="1"/>
             </a:ext>
           </a:extLst>
         </p:spPr>

</xml_diff>

<commit_message>
Update and extend quanteda cheatsheet for v4
</commit_message>
<xml_diff>
--- a/tests/cheatsheet/quanteda-cheatsheet.pptx
+++ b/tests/cheatsheet/quanteda-cheatsheet.pptx
@@ -6379,7 +6379,7 @@
                 <a:cs typeface="Source Sans Pro" charset="0"/>
                 <a:sym typeface="Source Sans Pro Light"/>
               </a:rPr>
-              <a:t>•  updated: 12/2022</a:t>
+              <a:t>•  updated: 12/2023</a:t>
             </a:r>
             <a:endParaRPr lang="en-US" sz="1400" dirty="0">
               <a:solidFill>
@@ -6568,7 +6568,7 @@
         <p:spPr>
           <a:xfrm>
             <a:off x="6676472" y="4723357"/>
-            <a:ext cx="7178303" cy="4570927"/>
+            <a:ext cx="7178303" cy="4757044"/>
           </a:xfrm>
           <a:prstGeom prst="rect">
             <a:avLst/>
@@ -7239,7 +7239,7 @@
         <p:spPr>
           <a:xfrm>
             <a:off x="6799156" y="5321031"/>
-            <a:ext cx="6948911" cy="3724096"/>
+            <a:ext cx="6948911" cy="4124206"/>
           </a:xfrm>
           <a:prstGeom prst="rect">
             <a:avLst/>
@@ -7298,7 +7298,7 @@
                 <a:ea typeface="Monaco" charset="0"/>
                 <a:cs typeface="Monaco" charset="0"/>
               </a:rPr>
-              <a:t> %&gt;%</a:t>
+              <a:t> |&gt;</a:t>
             </a:r>
           </a:p>
           <a:p>
@@ -7328,7 +7328,7 @@
                 <a:ea typeface="Monaco" charset="0"/>
                 <a:cs typeface="Monaco" charset="0"/>
               </a:rPr>
-              <a:t>(President == "Obama") %&gt;%</a:t>
+              <a:t>(President == "Obama") |&gt;</a:t>
             </a:r>
           </a:p>
           <a:p>
@@ -7342,6 +7342,42 @@
               <a:t>  </a:t>
             </a:r>
             <a:r>
+              <a:rPr lang="en-GB" sz="1300" dirty="0">
+                <a:solidFill>
+                  <a:srgbClr val="006AC7"/>
+                </a:solidFill>
+                <a:latin typeface="Monaco" charset="0"/>
+                <a:ea typeface="Monaco" charset="0"/>
+                <a:cs typeface="Monaco" charset="0"/>
+              </a:rPr>
+              <a:t>tokens</a:t>
+            </a:r>
+            <a:r>
+              <a:rPr lang="en-GB" sz="1300" dirty="0">
+                <a:solidFill>
+                  <a:schemeClr val="tx1"/>
+                </a:solidFill>
+                <a:latin typeface="Monaco" charset="0"/>
+                <a:ea typeface="Monaco" charset="0"/>
+                <a:cs typeface="Monaco" charset="0"/>
+              </a:rPr>
+              <a:t>() |&gt; </a:t>
+            </a:r>
+          </a:p>
+          <a:p>
+            <a:pPr algn="l"/>
+            <a:r>
+              <a:rPr lang="en-GB" sz="1300" dirty="0">
+                <a:solidFill>
+                  <a:srgbClr val="006AC7"/>
+                </a:solidFill>
+                <a:latin typeface="Monaco" charset="0"/>
+                <a:ea typeface="Monaco" charset="0"/>
+                <a:cs typeface="Monaco" charset="0"/>
+              </a:rPr>
+              <a:t>  </a:t>
+            </a:r>
+            <a:r>
               <a:rPr lang="en-GB" sz="1300" dirty="0" err="1">
                 <a:solidFill>
                   <a:srgbClr val="006AC7"/>
@@ -7350,56 +7386,140 @@
                 <a:ea typeface="Monaco" charset="0"/>
                 <a:cs typeface="Monaco" charset="0"/>
               </a:rPr>
+              <a:t>tokens_remove</a:t>
+            </a:r>
+            <a:r>
+              <a:rPr lang="en-GB" sz="1300" dirty="0">
+                <a:solidFill>
+                  <a:schemeClr val="tx1"/>
+                </a:solidFill>
+                <a:latin typeface="Monaco" charset="0"/>
+                <a:ea typeface="Monaco" charset="0"/>
+                <a:cs typeface="Monaco" charset="0"/>
+              </a:rPr>
+              <a:t>(pattern = </a:t>
+            </a:r>
+            <a:r>
+              <a:rPr lang="en-GB" sz="1300" dirty="0" err="1">
+                <a:solidFill>
+                  <a:srgbClr val="006AC7"/>
+                </a:solidFill>
+                <a:latin typeface="Monaco" charset="0"/>
+                <a:ea typeface="Monaco" charset="0"/>
+                <a:cs typeface="Monaco" charset="0"/>
+              </a:rPr>
+              <a:t>stopwords</a:t>
+            </a:r>
+            <a:r>
+              <a:rPr lang="en-GB" sz="1300" dirty="0">
+                <a:solidFill>
+                  <a:schemeClr val="tx1"/>
+                </a:solidFill>
+                <a:latin typeface="Monaco" charset="0"/>
+                <a:ea typeface="Monaco" charset="0"/>
+                <a:cs typeface="Monaco" charset="0"/>
+              </a:rPr>
+              <a:t>("</a:t>
+            </a:r>
+            <a:r>
+              <a:rPr lang="en-GB" sz="1300" dirty="0" err="1">
+                <a:solidFill>
+                  <a:schemeClr val="tx1"/>
+                </a:solidFill>
+                <a:latin typeface="Monaco" charset="0"/>
+                <a:ea typeface="Monaco" charset="0"/>
+                <a:cs typeface="Monaco" charset="0"/>
+              </a:rPr>
+              <a:t>en</a:t>
+            </a:r>
+            <a:r>
+              <a:rPr lang="en-GB" sz="1300" dirty="0">
+                <a:solidFill>
+                  <a:schemeClr val="tx1"/>
+                </a:solidFill>
+                <a:latin typeface="Monaco" charset="0"/>
+                <a:ea typeface="Monaco" charset="0"/>
+                <a:cs typeface="Monaco" charset="0"/>
+              </a:rPr>
+              <a:t>"))</a:t>
+            </a:r>
+            <a:r>
+              <a:rPr lang="en-GB" sz="1300" dirty="0">
+                <a:solidFill>
+                  <a:srgbClr val="006AC7"/>
+                </a:solidFill>
+                <a:latin typeface="Monaco" charset="0"/>
+                <a:ea typeface="Monaco" charset="0"/>
+                <a:cs typeface="Monaco" charset="0"/>
+              </a:rPr>
+              <a:t> </a:t>
+            </a:r>
+            <a:r>
+              <a:rPr lang="en-GB" sz="1300" dirty="0">
+                <a:solidFill>
+                  <a:schemeClr val="tx1"/>
+                </a:solidFill>
+                <a:latin typeface="Monaco" charset="0"/>
+                <a:ea typeface="Monaco" charset="0"/>
+                <a:cs typeface="Monaco" charset="0"/>
+              </a:rPr>
+              <a:t>|&gt;</a:t>
+            </a:r>
+            <a:r>
+              <a:rPr lang="en-GB" sz="1300" dirty="0">
+                <a:solidFill>
+                  <a:srgbClr val="006AC7"/>
+                </a:solidFill>
+                <a:latin typeface="Monaco" charset="0"/>
+                <a:ea typeface="Monaco" charset="0"/>
+                <a:cs typeface="Monaco" charset="0"/>
+              </a:rPr>
+              <a:t> </a:t>
+            </a:r>
+          </a:p>
+          <a:p>
+            <a:pPr algn="l"/>
+            <a:r>
+              <a:rPr lang="en-GB" sz="1300" dirty="0">
+                <a:solidFill>
+                  <a:srgbClr val="006AC7"/>
+                </a:solidFill>
+                <a:latin typeface="Monaco" charset="0"/>
+                <a:ea typeface="Monaco" charset="0"/>
+                <a:cs typeface="Monaco" charset="0"/>
+              </a:rPr>
+              <a:t>  </a:t>
+            </a:r>
+            <a:r>
+              <a:rPr lang="en-GB" sz="1300" dirty="0" err="1">
+                <a:solidFill>
+                  <a:srgbClr val="006AC7"/>
+                </a:solidFill>
+                <a:latin typeface="Monaco" charset="0"/>
+                <a:ea typeface="Monaco" charset="0"/>
+                <a:cs typeface="Monaco" charset="0"/>
+              </a:rPr>
               <a:t>dfm</a:t>
             </a:r>
             <a:r>
               <a:rPr lang="en-GB" sz="1300" dirty="0">
-                <a:latin typeface="Monaco" charset="0"/>
-                <a:ea typeface="Monaco" charset="0"/>
-                <a:cs typeface="Monaco" charset="0"/>
-              </a:rPr>
-              <a:t>(remove = </a:t>
-            </a:r>
-            <a:r>
-              <a:rPr lang="en-GB" sz="1300" dirty="0" err="1">
+                <a:solidFill>
+                  <a:schemeClr val="tx1"/>
+                </a:solidFill>
+                <a:latin typeface="Monaco" charset="0"/>
+                <a:ea typeface="Monaco" charset="0"/>
+                <a:cs typeface="Monaco" charset="0"/>
+              </a:rPr>
+              <a:t>() |&gt;  </a:t>
+            </a:r>
+          </a:p>
+          <a:p>
+            <a:pPr algn="l"/>
+            <a:r>
+              <a:rPr lang="en-GB" sz="1300" dirty="0">
                 <a:solidFill>
                   <a:srgbClr val="006AC7"/>
                 </a:solidFill>
-                <a:latin typeface="Monaco" charset="0"/>
-                <a:ea typeface="Monaco" charset="0"/>
-                <a:cs typeface="Monaco" charset="0"/>
-              </a:rPr>
-              <a:t>stopwords</a:t>
-            </a:r>
-            <a:r>
-              <a:rPr lang="en-GB" sz="1300" dirty="0">
-                <a:latin typeface="Monaco" charset="0"/>
-                <a:ea typeface="Monaco" charset="0"/>
-                <a:cs typeface="Monaco" charset="0"/>
-              </a:rPr>
-              <a:t>("</a:t>
-            </a:r>
-            <a:r>
-              <a:rPr lang="en-GB" sz="1300" dirty="0" err="1">
-                <a:latin typeface="Monaco" charset="0"/>
-                <a:ea typeface="Monaco" charset="0"/>
-                <a:cs typeface="Monaco" charset="0"/>
-              </a:rPr>
-              <a:t>en</a:t>
-            </a:r>
-            <a:r>
-              <a:rPr lang="en-GB" sz="1300" dirty="0">
-                <a:latin typeface="Monaco" charset="0"/>
-                <a:ea typeface="Monaco" charset="0"/>
-                <a:cs typeface="Monaco" charset="0"/>
-              </a:rPr>
-              <a:t>")) %&gt;%</a:t>
-            </a:r>
-          </a:p>
-          <a:p>
-            <a:pPr algn="l"/>
-            <a:r>
-              <a:rPr lang="en-GB" sz="1300" dirty="0">
                 <a:latin typeface="Monaco" charset="0"/>
                 <a:ea typeface="Monaco" charset="0"/>
                 <a:cs typeface="Monaco" charset="0"/>
@@ -7482,7 +7602,7 @@
                 <a:ea typeface="Monaco" charset="0"/>
                 <a:cs typeface="Monaco" charset="0"/>
               </a:rPr>
-              <a:t> %&gt;%   </a:t>
+              <a:t> |&gt; </a:t>
             </a:r>
           </a:p>
           <a:p>
@@ -7523,7 +7643,7 @@
                 <a:ea typeface="Monaco" charset="0"/>
                 <a:cs typeface="Monaco" charset="0"/>
               </a:rPr>
-              <a:t>  		    c("Obama", "Trump")) %&gt;%</a:t>
+              <a:t>  		    c("Obama", "Trump")) |&gt;</a:t>
             </a:r>
           </a:p>
           <a:p>
@@ -7537,6 +7657,42 @@
               <a:t>  </a:t>
             </a:r>
             <a:r>
+              <a:rPr lang="en-GB" sz="1300" dirty="0">
+                <a:solidFill>
+                  <a:srgbClr val="006AC7"/>
+                </a:solidFill>
+                <a:latin typeface="Monaco" charset="0"/>
+                <a:ea typeface="Monaco" charset="0"/>
+                <a:cs typeface="Monaco" charset="0"/>
+              </a:rPr>
+              <a:t>tokens</a:t>
+            </a:r>
+            <a:r>
+              <a:rPr lang="en-GB" sz="1300" dirty="0">
+                <a:solidFill>
+                  <a:schemeClr val="tx1"/>
+                </a:solidFill>
+                <a:latin typeface="Monaco" charset="0"/>
+                <a:ea typeface="Monaco" charset="0"/>
+                <a:cs typeface="Monaco" charset="0"/>
+              </a:rPr>
+              <a:t>() |&gt; </a:t>
+            </a:r>
+          </a:p>
+          <a:p>
+            <a:pPr algn="l"/>
+            <a:r>
+              <a:rPr lang="en-GB" sz="1300" dirty="0">
+                <a:solidFill>
+                  <a:srgbClr val="006AC7"/>
+                </a:solidFill>
+                <a:latin typeface="Monaco" charset="0"/>
+                <a:ea typeface="Monaco" charset="0"/>
+                <a:cs typeface="Monaco" charset="0"/>
+              </a:rPr>
+              <a:t>  </a:t>
+            </a:r>
+            <a:r>
               <a:rPr lang="en-GB" sz="1300" dirty="0" err="1">
                 <a:solidFill>
                   <a:srgbClr val="006AC7"/>
@@ -7549,22 +7705,28 @@
             </a:r>
             <a:r>
               <a:rPr lang="en-GB" sz="1300" dirty="0">
-                <a:latin typeface="Monaco" charset="0"/>
-                <a:ea typeface="Monaco" charset="0"/>
-                <a:cs typeface="Monaco" charset="0"/>
-              </a:rPr>
-              <a:t>(groups = "President", </a:t>
+                <a:solidFill>
+                  <a:schemeClr val="tx1"/>
+                </a:solidFill>
+                <a:latin typeface="Monaco" charset="0"/>
+                <a:ea typeface="Monaco" charset="0"/>
+                <a:cs typeface="Monaco" charset="0"/>
+              </a:rPr>
+              <a:t>() |&gt; </a:t>
             </a:r>
           </a:p>
           <a:p>
             <a:pPr algn="l"/>
             <a:r>
               <a:rPr lang="en-GB" sz="1300" dirty="0">
-                <a:latin typeface="Monaco" charset="0"/>
-                <a:ea typeface="Monaco" charset="0"/>
-                <a:cs typeface="Monaco" charset="0"/>
-              </a:rPr>
-              <a:t>	remove = </a:t>
+                <a:solidFill>
+                  <a:srgbClr val="006AC7"/>
+                </a:solidFill>
+                <a:latin typeface="Monaco" charset="0"/>
+                <a:ea typeface="Monaco" charset="0"/>
+                <a:cs typeface="Monaco" charset="0"/>
+              </a:rPr>
+              <a:t>  </a:t>
             </a:r>
             <a:r>
               <a:rPr lang="en-GB" sz="1300" dirty="0" err="1">
@@ -7575,23 +7737,43 @@
                 <a:ea typeface="Monaco" charset="0"/>
                 <a:cs typeface="Monaco" charset="0"/>
               </a:rPr>
-              <a:t>stopwords</a:t>
+              <a:t>dfm_group</a:t>
             </a:r>
             <a:r>
               <a:rPr lang="en-GB" sz="1300" dirty="0">
-                <a:latin typeface="Monaco" charset="0"/>
-                <a:ea typeface="Monaco" charset="0"/>
-                <a:cs typeface="Monaco" charset="0"/>
-              </a:rPr>
-              <a:t>("</a:t>
+                <a:solidFill>
+                  <a:schemeClr val="tx1"/>
+                </a:solidFill>
+                <a:latin typeface="Monaco" charset="0"/>
+                <a:ea typeface="Monaco" charset="0"/>
+                <a:cs typeface="Monaco" charset="0"/>
+              </a:rPr>
+              <a:t>(groups = President) |&gt; </a:t>
+            </a:r>
+          </a:p>
+          <a:p>
+            <a:pPr algn="l"/>
+            <a:r>
+              <a:rPr lang="en-GB" sz="1300" dirty="0">
+                <a:solidFill>
+                  <a:srgbClr val="006AC7"/>
+                </a:solidFill>
+                <a:latin typeface="Monaco" charset="0"/>
+                <a:ea typeface="Monaco" charset="0"/>
+                <a:cs typeface="Monaco" charset="0"/>
+              </a:rPr>
+              <a:t>  </a:t>
             </a:r>
             <a:r>
               <a:rPr lang="en-GB" sz="1300" dirty="0" err="1">
-                <a:latin typeface="Monaco" charset="0"/>
-                <a:ea typeface="Monaco" charset="0"/>
-                <a:cs typeface="Monaco" charset="0"/>
-              </a:rPr>
-              <a:t>en</a:t>
+                <a:solidFill>
+                  <a:srgbClr val="006AC7"/>
+                </a:solidFill>
+                <a:latin typeface="Monaco" charset="0"/>
+                <a:ea typeface="Monaco" charset="0"/>
+                <a:cs typeface="Monaco" charset="0"/>
+              </a:rPr>
+              <a:t>textstat_keyness</a:t>
             </a:r>
             <a:r>
               <a:rPr lang="en-GB" sz="1300" dirty="0">
@@ -7599,40 +7781,7 @@
                 <a:ea typeface="Monaco" charset="0"/>
                 <a:cs typeface="Monaco" charset="0"/>
               </a:rPr>
-              <a:t>")) %&gt;%   </a:t>
-            </a:r>
-          </a:p>
-          <a:p>
-            <a:pPr algn="l"/>
-            <a:r>
-              <a:rPr lang="en-GB" sz="1300" dirty="0">
-                <a:solidFill>
-                  <a:srgbClr val="006AC7"/>
-                </a:solidFill>
-                <a:latin typeface="Monaco" charset="0"/>
-                <a:ea typeface="Monaco" charset="0"/>
-                <a:cs typeface="Monaco" charset="0"/>
-              </a:rPr>
-              <a:t>  </a:t>
-            </a:r>
-            <a:r>
-              <a:rPr lang="en-GB" sz="1300" dirty="0" err="1">
-                <a:solidFill>
-                  <a:srgbClr val="006AC7"/>
-                </a:solidFill>
-                <a:latin typeface="Monaco" charset="0"/>
-                <a:ea typeface="Monaco" charset="0"/>
-                <a:cs typeface="Monaco" charset="0"/>
-              </a:rPr>
-              <a:t>textstat_keyness</a:t>
-            </a:r>
-            <a:r>
-              <a:rPr lang="en-GB" sz="1300" dirty="0">
-                <a:latin typeface="Monaco" charset="0"/>
-                <a:ea typeface="Monaco" charset="0"/>
-                <a:cs typeface="Monaco" charset="0"/>
-              </a:rPr>
-              <a:t>(target = "Trump") %&gt;%   </a:t>
+              <a:t>(target = "Trump") |&gt; </a:t>
             </a:r>
           </a:p>
           <a:p>
@@ -7722,6 +7871,25 @@
           <a:p>
             <a:pPr algn="l"/>
             <a:r>
+              <a:rPr lang="en-GB" sz="1300" dirty="0">
+                <a:solidFill>
+                  <a:srgbClr val="006AC7"/>
+                </a:solidFill>
+                <a:latin typeface="Monaco" charset="0"/>
+                <a:ea typeface="Monaco" charset="0"/>
+                <a:cs typeface="Monaco" charset="0"/>
+              </a:rPr>
+              <a:t>textplot_scale1d</a:t>
+            </a:r>
+            <a:r>
+              <a:rPr lang="en-GB" sz="1300" dirty="0">
+                <a:latin typeface="Monaco" charset="0"/>
+                <a:ea typeface="Monaco" charset="0"/>
+                <a:cs typeface="Monaco" charset="0"/>
+              </a:rPr>
+              <a:t>(</a:t>
+            </a:r>
+            <a:r>
               <a:rPr lang="en-GB" sz="1300" i="1" dirty="0" err="1">
                 <a:latin typeface="Monaco" charset="0"/>
                 <a:ea typeface="Monaco" charset="0"/>
@@ -7735,37 +7903,23 @@
                 <a:ea typeface="Monaco" charset="0"/>
                 <a:cs typeface="Monaco" charset="0"/>
               </a:rPr>
-              <a:t> %&gt;% </a:t>
-            </a:r>
-          </a:p>
-          <a:p>
-            <a:pPr algn="l"/>
+              <a:t>,</a:t>
+            </a:r>
+            <a:r>
+              <a:rPr lang="en-GB" sz="1300" i="1" dirty="0">
+                <a:latin typeface="Monaco" charset="0"/>
+                <a:ea typeface="Monaco" charset="0"/>
+                <a:cs typeface="Monaco" charset="0"/>
+              </a:rPr>
+              <a:t> </a:t>
+            </a:r>
             <a:r>
               <a:rPr lang="en-GB" sz="1300" dirty="0">
                 <a:latin typeface="Monaco" charset="0"/>
                 <a:ea typeface="Monaco" charset="0"/>
                 <a:cs typeface="Monaco" charset="0"/>
               </a:rPr>
-              <a:t>  </a:t>
-            </a:r>
-            <a:r>
-              <a:rPr lang="en-GB" sz="1300" dirty="0">
-                <a:solidFill>
-                  <a:srgbClr val="006AC7"/>
-                </a:solidFill>
-                <a:latin typeface="Monaco" charset="0"/>
-                <a:ea typeface="Monaco" charset="0"/>
-                <a:cs typeface="Monaco" charset="0"/>
-              </a:rPr>
-              <a:t>textplot_scale1d</a:t>
-            </a:r>
-            <a:r>
-              <a:rPr lang="en-GB" sz="1300" dirty="0">
-                <a:latin typeface="Monaco" charset="0"/>
-                <a:ea typeface="Monaco" charset="0"/>
-                <a:cs typeface="Monaco" charset="0"/>
-              </a:rPr>
-              <a:t>(groups = party, margin = "documents")</a:t>
+              <a:t>margin = "documents")</a:t>
             </a:r>
             <a:r>
               <a:rPr lang="en-GB" sz="1300" dirty="0">
@@ -8683,7 +8837,7 @@
         </p:nvSpPr>
         <p:spPr>
           <a:xfrm>
-            <a:off x="-295435" y="9583340"/>
+            <a:off x="-243805" y="9700899"/>
             <a:ext cx="6822465" cy="871953"/>
           </a:xfrm>
           <a:prstGeom prst="rect">
@@ -8897,7 +9051,7 @@
                 <a:cs typeface="Source Sans Pro" charset="0"/>
                 <a:sym typeface="Source Sans Pro Light"/>
               </a:rPr>
-              <a:t>•  updated: 11/2022</a:t>
+              <a:t>•  updated: 12/2023</a:t>
             </a:r>
             <a:endParaRPr lang="en-US" sz="1400" dirty="0">
               <a:solidFill>
@@ -8919,7 +9073,7 @@
         </p:nvSpPr>
         <p:spPr>
           <a:xfrm>
-            <a:off x="6676471" y="9635980"/>
+            <a:off x="6676471" y="9822096"/>
             <a:ext cx="7178303" cy="835234"/>
           </a:xfrm>
           <a:prstGeom prst="rect">
@@ -8989,7 +9143,7 @@
         </p:nvSpPr>
         <p:spPr>
           <a:xfrm>
-            <a:off x="6799156" y="9950760"/>
+            <a:off x="6799156" y="10136876"/>
             <a:ext cx="6265777" cy="400110"/>
           </a:xfrm>
           <a:prstGeom prst="rect">
@@ -9146,7 +9300,7 @@
         </p:nvSpPr>
         <p:spPr>
           <a:xfrm>
-            <a:off x="6640003" y="9414629"/>
+            <a:off x="6640003" y="9600745"/>
             <a:ext cx="7253999" cy="482886"/>
           </a:xfrm>
           <a:prstGeom prst="roundRect">
@@ -9878,15 +10032,31 @@
           <a:p>
             <a:pPr algn="l"/>
             <a:r>
+              <a:rPr lang="en-US" sz="1300" dirty="0" err="1">
+                <a:solidFill>
+                  <a:srgbClr val="006AC7"/>
+                </a:solidFill>
+                <a:latin typeface="Monaco" charset="0"/>
+                <a:ea typeface="Monaco" charset="0"/>
+                <a:cs typeface="Monaco" charset="0"/>
+              </a:rPr>
+              <a:t>as.character</a:t>
+            </a:r>
+            <a:r>
               <a:rPr lang="en-US" sz="1300" dirty="0">
-                <a:solidFill>
-                  <a:srgbClr val="006AC7"/>
-                </a:solidFill>
-                <a:latin typeface="Monaco" charset="0"/>
-                <a:ea typeface="Monaco" charset="0"/>
-                <a:cs typeface="Monaco" charset="0"/>
-              </a:rPr>
-              <a:t>texts</a:t>
+                <a:latin typeface="Monaco" charset="0"/>
+                <a:ea typeface="Monaco" charset="0"/>
+                <a:cs typeface="Monaco" charset="0"/>
+              </a:rPr>
+              <a:t>(</a:t>
+            </a:r>
+            <a:r>
+              <a:rPr lang="en-US" sz="1300" i="1" dirty="0">
+                <a:latin typeface="Monaco" charset="0"/>
+                <a:ea typeface="Monaco" charset="0"/>
+                <a:cs typeface="Monaco" charset="0"/>
+              </a:rPr>
+              <a:t>corpus</a:t>
             </a:r>
             <a:r>
               <a:rPr lang="en-US" sz="1300" dirty="0">
@@ -9894,23 +10064,7 @@
                 <a:ea typeface="Monaco" charset="0"/>
                 <a:cs typeface="Monaco" charset="0"/>
               </a:rPr>
-              <a:t>(</a:t>
-            </a:r>
-            <a:r>
-              <a:rPr lang="en-US" sz="1300" i="1" dirty="0">
-                <a:latin typeface="Monaco" charset="0"/>
-                <a:ea typeface="Monaco" charset="0"/>
-                <a:cs typeface="Monaco" charset="0"/>
-              </a:rPr>
-              <a:t>corpus</a:t>
-            </a:r>
-            <a:r>
-              <a:rPr lang="en-US" sz="1300" dirty="0">
-                <a:latin typeface="Monaco" charset="0"/>
-                <a:ea typeface="Monaco" charset="0"/>
-                <a:cs typeface="Monaco" charset="0"/>
-              </a:rPr>
-              <a:t>)			</a:t>
+              <a:t>)		</a:t>
             </a:r>
             <a:r>
               <a:rPr lang="en-US" sz="1300" i="1" dirty="0">

</xml_diff>